<commit_message>
new architecture of MultilevelEventPrediction
</commit_message>
<xml_diff>
--- a/dy.pptx
+++ b/dy.pptx
@@ -8,7 +8,8 @@
     <p:sldId id="256" r:id="rId2"/>
     <p:sldId id="257" r:id="rId3"/>
     <p:sldId id="258" r:id="rId4"/>
-    <p:sldId id="259" r:id="rId5"/>
+    <p:sldId id="260" r:id="rId5"/>
+    <p:sldId id="259" r:id="rId6"/>
   </p:sldIdLst>
   <p:sldSz cx="12192000" cy="6858000"/>
   <p:notesSz cx="6858000" cy="9144000"/>
@@ -109,7 +110,7 @@
   </p:defaultTextStyle>
   <p:extLst>
     <p:ext uri="{EFAFB233-063F-42B5-8137-9DF3F51BA10A}">
-      <p15:sldGuideLst xmlns:p15="http://schemas.microsoft.com/office/powerpoint/2012/main" xmlns=""/>
+      <p15:sldGuideLst xmlns="" xmlns:p15="http://schemas.microsoft.com/office/powerpoint/2012/main"/>
     </p:ext>
   </p:extLst>
 </p:presentation>
@@ -246,7 +247,7 @@
           <a:p>
             <a:fld id="{3A4BDD1D-B22B-4ED6-A560-FD2CA5D857D7}" type="datetimeFigureOut">
               <a:rPr lang="ru-RU" smtClean="0"/>
-              <a:t>10.11.2023</a:t>
+              <a:t>19.02.2024</a:t>
             </a:fld>
             <a:endParaRPr lang="ru-RU"/>
           </a:p>
@@ -416,7 +417,7 @@
           <a:p>
             <a:fld id="{3A4BDD1D-B22B-4ED6-A560-FD2CA5D857D7}" type="datetimeFigureOut">
               <a:rPr lang="ru-RU" smtClean="0"/>
-              <a:t>10.11.2023</a:t>
+              <a:t>19.02.2024</a:t>
             </a:fld>
             <a:endParaRPr lang="ru-RU"/>
           </a:p>
@@ -596,7 +597,7 @@
           <a:p>
             <a:fld id="{3A4BDD1D-B22B-4ED6-A560-FD2CA5D857D7}" type="datetimeFigureOut">
               <a:rPr lang="ru-RU" smtClean="0"/>
-              <a:t>10.11.2023</a:t>
+              <a:t>19.02.2024</a:t>
             </a:fld>
             <a:endParaRPr lang="ru-RU"/>
           </a:p>
@@ -766,7 +767,7 @@
           <a:p>
             <a:fld id="{3A4BDD1D-B22B-4ED6-A560-FD2CA5D857D7}" type="datetimeFigureOut">
               <a:rPr lang="ru-RU" smtClean="0"/>
-              <a:t>10.11.2023</a:t>
+              <a:t>19.02.2024</a:t>
             </a:fld>
             <a:endParaRPr lang="ru-RU"/>
           </a:p>
@@ -1012,7 +1013,7 @@
           <a:p>
             <a:fld id="{3A4BDD1D-B22B-4ED6-A560-FD2CA5D857D7}" type="datetimeFigureOut">
               <a:rPr lang="ru-RU" smtClean="0"/>
-              <a:t>10.11.2023</a:t>
+              <a:t>19.02.2024</a:t>
             </a:fld>
             <a:endParaRPr lang="ru-RU"/>
           </a:p>
@@ -1244,7 +1245,7 @@
           <a:p>
             <a:fld id="{3A4BDD1D-B22B-4ED6-A560-FD2CA5D857D7}" type="datetimeFigureOut">
               <a:rPr lang="ru-RU" smtClean="0"/>
-              <a:t>10.11.2023</a:t>
+              <a:t>19.02.2024</a:t>
             </a:fld>
             <a:endParaRPr lang="ru-RU"/>
           </a:p>
@@ -1611,7 +1612,7 @@
           <a:p>
             <a:fld id="{3A4BDD1D-B22B-4ED6-A560-FD2CA5D857D7}" type="datetimeFigureOut">
               <a:rPr lang="ru-RU" smtClean="0"/>
-              <a:t>10.11.2023</a:t>
+              <a:t>19.02.2024</a:t>
             </a:fld>
             <a:endParaRPr lang="ru-RU"/>
           </a:p>
@@ -1729,7 +1730,7 @@
           <a:p>
             <a:fld id="{3A4BDD1D-B22B-4ED6-A560-FD2CA5D857D7}" type="datetimeFigureOut">
               <a:rPr lang="ru-RU" smtClean="0"/>
-              <a:t>10.11.2023</a:t>
+              <a:t>19.02.2024</a:t>
             </a:fld>
             <a:endParaRPr lang="ru-RU"/>
           </a:p>
@@ -1824,7 +1825,7 @@
           <a:p>
             <a:fld id="{3A4BDD1D-B22B-4ED6-A560-FD2CA5D857D7}" type="datetimeFigureOut">
               <a:rPr lang="ru-RU" smtClean="0"/>
-              <a:t>10.11.2023</a:t>
+              <a:t>19.02.2024</a:t>
             </a:fld>
             <a:endParaRPr lang="ru-RU"/>
           </a:p>
@@ -2101,7 +2102,7 @@
           <a:p>
             <a:fld id="{3A4BDD1D-B22B-4ED6-A560-FD2CA5D857D7}" type="datetimeFigureOut">
               <a:rPr lang="ru-RU" smtClean="0"/>
-              <a:t>10.11.2023</a:t>
+              <a:t>19.02.2024</a:t>
             </a:fld>
             <a:endParaRPr lang="ru-RU"/>
           </a:p>
@@ -2354,7 +2355,7 @@
           <a:p>
             <a:fld id="{3A4BDD1D-B22B-4ED6-A560-FD2CA5D857D7}" type="datetimeFigureOut">
               <a:rPr lang="ru-RU" smtClean="0"/>
-              <a:t>10.11.2023</a:t>
+              <a:t>19.02.2024</a:t>
             </a:fld>
             <a:endParaRPr lang="ru-RU"/>
           </a:p>
@@ -2567,7 +2568,7 @@
           <a:p>
             <a:fld id="{3A4BDD1D-B22B-4ED6-A560-FD2CA5D857D7}" type="datetimeFigureOut">
               <a:rPr lang="ru-RU" smtClean="0"/>
-              <a:t>10.11.2023</a:t>
+              <a:t>19.02.2024</a:t>
             </a:fld>
             <a:endParaRPr lang="ru-RU"/>
           </a:p>
@@ -7416,6 +7417,13 @@
   <p:clrMapOvr>
     <a:masterClrMapping/>
   </p:clrMapOvr>
+  <p:timing>
+    <p:tnLst>
+      <p:par>
+        <p:cTn id="1" dur="indefinite" restart="never" nodeType="tmRoot"/>
+      </p:par>
+    </p:tnLst>
+  </p:timing>
 </p:sld>
 </file>
 
@@ -8972,6 +8980,13 @@
   <p:clrMapOvr>
     <a:masterClrMapping/>
   </p:clrMapOvr>
+  <p:timing>
+    <p:tnLst>
+      <p:par>
+        <p:cTn id="1" dur="indefinite" restart="never" nodeType="tmRoot"/>
+      </p:par>
+    </p:tnLst>
+  </p:timing>
 </p:sld>
 </file>
 
@@ -12671,6 +12686,4463 @@
       </p:grpSpPr>
       <p:sp>
         <p:nvSpPr>
+          <p:cNvPr id="4" name="Rectangle 3"/>
+          <p:cNvSpPr/>
+          <p:nvPr/>
+        </p:nvSpPr>
+        <p:spPr>
+          <a:xfrm>
+            <a:off x="612475" y="5779698"/>
+            <a:ext cx="10981427" cy="560717"/>
+          </a:xfrm>
+          <a:prstGeom prst="rect">
+            <a:avLst/>
+          </a:prstGeom>
+        </p:spPr>
+        <p:style>
+          <a:lnRef idx="2">
+            <a:schemeClr val="accent1">
+              <a:shade val="50000"/>
+            </a:schemeClr>
+          </a:lnRef>
+          <a:fillRef idx="1">
+            <a:schemeClr val="accent1"/>
+          </a:fillRef>
+          <a:effectRef idx="0">
+            <a:schemeClr val="accent1"/>
+          </a:effectRef>
+          <a:fontRef idx="minor">
+            <a:schemeClr val="lt1"/>
+          </a:fontRef>
+        </p:style>
+        <p:txBody>
+          <a:bodyPr rtlCol="0" anchor="ctr"/>
+          <a:lstStyle/>
+          <a:p>
+            <a:pPr algn="ctr"/>
+            <a:r>
+              <a:rPr lang="en-US" dirty="0" smtClean="0"/>
+              <a:t>input</a:t>
+            </a:r>
+            <a:endParaRPr lang="ru-RU" dirty="0"/>
+          </a:p>
+        </p:txBody>
+      </p:sp>
+      <p:cxnSp>
+        <p:nvCxnSpPr>
+          <p:cNvPr id="9" name="Straight Connector 8"/>
+          <p:cNvCxnSpPr>
+            <a:endCxn id="77" idx="2"/>
+          </p:cNvCxnSpPr>
+          <p:nvPr/>
+        </p:nvCxnSpPr>
+        <p:spPr>
+          <a:xfrm flipH="1" flipV="1">
+            <a:off x="318201" y="4392824"/>
+            <a:ext cx="294274" cy="1386876"/>
+          </a:xfrm>
+          <a:prstGeom prst="line">
+            <a:avLst/>
+          </a:prstGeom>
+        </p:spPr>
+        <p:style>
+          <a:lnRef idx="1">
+            <a:schemeClr val="accent1"/>
+          </a:lnRef>
+          <a:fillRef idx="0">
+            <a:schemeClr val="accent1"/>
+          </a:fillRef>
+          <a:effectRef idx="0">
+            <a:schemeClr val="accent1"/>
+          </a:effectRef>
+          <a:fontRef idx="minor">
+            <a:schemeClr val="tx1"/>
+          </a:fontRef>
+        </p:style>
+      </p:cxnSp>
+      <p:cxnSp>
+        <p:nvCxnSpPr>
+          <p:cNvPr id="11" name="Straight Connector 10"/>
+          <p:cNvCxnSpPr>
+            <a:endCxn id="77" idx="6"/>
+          </p:cNvCxnSpPr>
+          <p:nvPr/>
+        </p:nvCxnSpPr>
+        <p:spPr>
+          <a:xfrm flipH="1" flipV="1">
+            <a:off x="1034540" y="4392824"/>
+            <a:ext cx="10559364" cy="1386876"/>
+          </a:xfrm>
+          <a:prstGeom prst="line">
+            <a:avLst/>
+          </a:prstGeom>
+        </p:spPr>
+        <p:style>
+          <a:lnRef idx="1">
+            <a:schemeClr val="accent1"/>
+          </a:lnRef>
+          <a:fillRef idx="0">
+            <a:schemeClr val="accent1"/>
+          </a:fillRef>
+          <a:effectRef idx="0">
+            <a:schemeClr val="accent1"/>
+          </a:effectRef>
+          <a:fontRef idx="minor">
+            <a:schemeClr val="tx1"/>
+          </a:fontRef>
+        </p:style>
+      </p:cxnSp>
+      <p:cxnSp>
+        <p:nvCxnSpPr>
+          <p:cNvPr id="13" name="Straight Connector 12"/>
+          <p:cNvCxnSpPr>
+            <a:endCxn id="79" idx="2"/>
+          </p:cNvCxnSpPr>
+          <p:nvPr/>
+        </p:nvCxnSpPr>
+        <p:spPr>
+          <a:xfrm flipV="1">
+            <a:off x="612474" y="4463204"/>
+            <a:ext cx="1104999" cy="1316496"/>
+          </a:xfrm>
+          <a:prstGeom prst="line">
+            <a:avLst/>
+          </a:prstGeom>
+        </p:spPr>
+        <p:style>
+          <a:lnRef idx="1">
+            <a:schemeClr val="accent1"/>
+          </a:lnRef>
+          <a:fillRef idx="0">
+            <a:schemeClr val="accent1"/>
+          </a:fillRef>
+          <a:effectRef idx="0">
+            <a:schemeClr val="accent1"/>
+          </a:effectRef>
+          <a:fontRef idx="minor">
+            <a:schemeClr val="tx1"/>
+          </a:fontRef>
+        </p:style>
+      </p:cxnSp>
+      <p:cxnSp>
+        <p:nvCxnSpPr>
+          <p:cNvPr id="15" name="Straight Connector 14"/>
+          <p:cNvCxnSpPr>
+            <a:endCxn id="79" idx="6"/>
+          </p:cNvCxnSpPr>
+          <p:nvPr/>
+        </p:nvCxnSpPr>
+        <p:spPr>
+          <a:xfrm flipH="1" flipV="1">
+            <a:off x="2433812" y="4463204"/>
+            <a:ext cx="9160093" cy="1316496"/>
+          </a:xfrm>
+          <a:prstGeom prst="line">
+            <a:avLst/>
+          </a:prstGeom>
+        </p:spPr>
+        <p:style>
+          <a:lnRef idx="1">
+            <a:schemeClr val="accent1"/>
+          </a:lnRef>
+          <a:fillRef idx="0">
+            <a:schemeClr val="accent1"/>
+          </a:fillRef>
+          <a:effectRef idx="0">
+            <a:schemeClr val="accent1"/>
+          </a:effectRef>
+          <a:fontRef idx="minor">
+            <a:schemeClr val="tx1"/>
+          </a:fontRef>
+        </p:style>
+      </p:cxnSp>
+      <p:cxnSp>
+        <p:nvCxnSpPr>
+          <p:cNvPr id="17" name="Straight Connector 16"/>
+          <p:cNvCxnSpPr>
+            <a:endCxn id="80" idx="2"/>
+          </p:cNvCxnSpPr>
+          <p:nvPr/>
+        </p:nvCxnSpPr>
+        <p:spPr>
+          <a:xfrm flipV="1">
+            <a:off x="612475" y="4357927"/>
+            <a:ext cx="2950444" cy="1421772"/>
+          </a:xfrm>
+          <a:prstGeom prst="line">
+            <a:avLst/>
+          </a:prstGeom>
+        </p:spPr>
+        <p:style>
+          <a:lnRef idx="1">
+            <a:schemeClr val="accent1"/>
+          </a:lnRef>
+          <a:fillRef idx="0">
+            <a:schemeClr val="accent1"/>
+          </a:fillRef>
+          <a:effectRef idx="0">
+            <a:schemeClr val="accent1"/>
+          </a:effectRef>
+          <a:fontRef idx="minor">
+            <a:schemeClr val="tx1"/>
+          </a:fontRef>
+        </p:style>
+      </p:cxnSp>
+      <p:cxnSp>
+        <p:nvCxnSpPr>
+          <p:cNvPr id="19" name="Straight Connector 18"/>
+          <p:cNvCxnSpPr>
+            <a:endCxn id="80" idx="6"/>
+          </p:cNvCxnSpPr>
+          <p:nvPr/>
+        </p:nvCxnSpPr>
+        <p:spPr>
+          <a:xfrm flipH="1" flipV="1">
+            <a:off x="4279258" y="4357927"/>
+            <a:ext cx="7314645" cy="1421774"/>
+          </a:xfrm>
+          <a:prstGeom prst="line">
+            <a:avLst/>
+          </a:prstGeom>
+        </p:spPr>
+        <p:style>
+          <a:lnRef idx="1">
+            <a:schemeClr val="accent1"/>
+          </a:lnRef>
+          <a:fillRef idx="0">
+            <a:schemeClr val="accent1"/>
+          </a:fillRef>
+          <a:effectRef idx="0">
+            <a:schemeClr val="accent1"/>
+          </a:effectRef>
+          <a:fontRef idx="minor">
+            <a:schemeClr val="tx1"/>
+          </a:fontRef>
+        </p:style>
+      </p:cxnSp>
+      <p:sp>
+        <p:nvSpPr>
+          <p:cNvPr id="77" name="Oval 32"/>
+          <p:cNvSpPr/>
+          <p:nvPr/>
+        </p:nvSpPr>
+        <p:spPr>
+          <a:xfrm>
+            <a:off x="318201" y="4070753"/>
+            <a:ext cx="716339" cy="644141"/>
+          </a:xfrm>
+          <a:prstGeom prst="ellipse">
+            <a:avLst/>
+          </a:prstGeom>
+        </p:spPr>
+        <p:style>
+          <a:lnRef idx="2">
+            <a:schemeClr val="accent1">
+              <a:shade val="50000"/>
+            </a:schemeClr>
+          </a:lnRef>
+          <a:fillRef idx="1">
+            <a:schemeClr val="accent1"/>
+          </a:fillRef>
+          <a:effectRef idx="0">
+            <a:schemeClr val="accent1"/>
+          </a:effectRef>
+          <a:fontRef idx="minor">
+            <a:schemeClr val="lt1"/>
+          </a:fontRef>
+        </p:style>
+        <p:txBody>
+          <a:bodyPr rtlCol="0" anchor="ctr"/>
+          <a:lstStyle/>
+          <a:p>
+            <a:pPr algn="ctr"/>
+            <a:r>
+              <a:rPr lang="en-US" sz="3600" dirty="0"/>
+              <a:t>L</a:t>
+            </a:r>
+            <a:endParaRPr lang="ru-RU" sz="3600" dirty="0"/>
+          </a:p>
+        </p:txBody>
+      </p:sp>
+      <p:sp>
+        <p:nvSpPr>
+          <p:cNvPr id="78" name="TextBox 77"/>
+          <p:cNvSpPr txBox="1"/>
+          <p:nvPr/>
+        </p:nvSpPr>
+        <p:spPr>
+          <a:xfrm>
+            <a:off x="5671127" y="4802770"/>
+            <a:ext cx="3232177" cy="830997"/>
+          </a:xfrm>
+          <a:prstGeom prst="rect">
+            <a:avLst/>
+          </a:prstGeom>
+          <a:noFill/>
+        </p:spPr>
+        <p:txBody>
+          <a:bodyPr wrap="square" rtlCol="0">
+            <a:spAutoFit/>
+          </a:bodyPr>
+          <a:lstStyle/>
+          <a:p>
+            <a:r>
+              <a:rPr lang="en-US" sz="1600" dirty="0" smtClean="0"/>
+              <a:t>Possibly fully connected, with small (or negative) random initial resources and random delays.</a:t>
+            </a:r>
+            <a:endParaRPr lang="ru-RU" sz="1600" dirty="0"/>
+          </a:p>
+        </p:txBody>
+      </p:sp>
+      <p:sp>
+        <p:nvSpPr>
+          <p:cNvPr id="79" name="Oval 32"/>
+          <p:cNvSpPr/>
+          <p:nvPr/>
+        </p:nvSpPr>
+        <p:spPr>
+          <a:xfrm>
+            <a:off x="1717473" y="4141133"/>
+            <a:ext cx="716339" cy="644141"/>
+          </a:xfrm>
+          <a:prstGeom prst="ellipse">
+            <a:avLst/>
+          </a:prstGeom>
+        </p:spPr>
+        <p:style>
+          <a:lnRef idx="2">
+            <a:schemeClr val="accent1">
+              <a:shade val="50000"/>
+            </a:schemeClr>
+          </a:lnRef>
+          <a:fillRef idx="1">
+            <a:schemeClr val="accent1"/>
+          </a:fillRef>
+          <a:effectRef idx="0">
+            <a:schemeClr val="accent1"/>
+          </a:effectRef>
+          <a:fontRef idx="minor">
+            <a:schemeClr val="lt1"/>
+          </a:fontRef>
+        </p:style>
+        <p:txBody>
+          <a:bodyPr rtlCol="0" anchor="ctr"/>
+          <a:lstStyle/>
+          <a:p>
+            <a:pPr algn="ctr"/>
+            <a:r>
+              <a:rPr lang="en-US" sz="3600" dirty="0"/>
+              <a:t>L</a:t>
+            </a:r>
+            <a:endParaRPr lang="ru-RU" sz="3600" dirty="0"/>
+          </a:p>
+        </p:txBody>
+      </p:sp>
+      <p:sp>
+        <p:nvSpPr>
+          <p:cNvPr id="80" name="Oval 32"/>
+          <p:cNvSpPr/>
+          <p:nvPr/>
+        </p:nvSpPr>
+        <p:spPr>
+          <a:xfrm>
+            <a:off x="3562919" y="4035856"/>
+            <a:ext cx="716339" cy="644141"/>
+          </a:xfrm>
+          <a:prstGeom prst="ellipse">
+            <a:avLst/>
+          </a:prstGeom>
+        </p:spPr>
+        <p:style>
+          <a:lnRef idx="2">
+            <a:schemeClr val="accent1">
+              <a:shade val="50000"/>
+            </a:schemeClr>
+          </a:lnRef>
+          <a:fillRef idx="1">
+            <a:schemeClr val="accent1"/>
+          </a:fillRef>
+          <a:effectRef idx="0">
+            <a:schemeClr val="accent1"/>
+          </a:effectRef>
+          <a:fontRef idx="minor">
+            <a:schemeClr val="lt1"/>
+          </a:fontRef>
+        </p:style>
+        <p:txBody>
+          <a:bodyPr rtlCol="0" anchor="ctr"/>
+          <a:lstStyle/>
+          <a:p>
+            <a:pPr algn="ctr"/>
+            <a:r>
+              <a:rPr lang="en-US" sz="3600" dirty="0"/>
+              <a:t>L</a:t>
+            </a:r>
+            <a:endParaRPr lang="ru-RU" sz="3600" dirty="0"/>
+          </a:p>
+        </p:txBody>
+      </p:sp>
+      <p:sp>
+        <p:nvSpPr>
+          <p:cNvPr id="81" name="Oval 32"/>
+          <p:cNvSpPr/>
+          <p:nvPr/>
+        </p:nvSpPr>
+        <p:spPr>
+          <a:xfrm>
+            <a:off x="251722" y="2734822"/>
+            <a:ext cx="716339" cy="644141"/>
+          </a:xfrm>
+          <a:prstGeom prst="ellipse">
+            <a:avLst/>
+          </a:prstGeom>
+        </p:spPr>
+        <p:style>
+          <a:lnRef idx="2">
+            <a:schemeClr val="accent1">
+              <a:shade val="50000"/>
+            </a:schemeClr>
+          </a:lnRef>
+          <a:fillRef idx="1">
+            <a:schemeClr val="accent1"/>
+          </a:fillRef>
+          <a:effectRef idx="0">
+            <a:schemeClr val="accent1"/>
+          </a:effectRef>
+          <a:fontRef idx="minor">
+            <a:schemeClr val="lt1"/>
+          </a:fontRef>
+        </p:style>
+        <p:txBody>
+          <a:bodyPr rtlCol="0" anchor="ctr"/>
+          <a:lstStyle/>
+          <a:p>
+            <a:pPr algn="ctr"/>
+            <a:r>
+              <a:rPr lang="en-US" sz="1200" dirty="0" smtClean="0"/>
+              <a:t>WTA</a:t>
+            </a:r>
+            <a:endParaRPr lang="ru-RU" sz="1200" dirty="0"/>
+          </a:p>
+        </p:txBody>
+      </p:sp>
+      <p:sp>
+        <p:nvSpPr>
+          <p:cNvPr id="82" name="Oval 32"/>
+          <p:cNvSpPr/>
+          <p:nvPr/>
+        </p:nvSpPr>
+        <p:spPr>
+          <a:xfrm>
+            <a:off x="1922423" y="2747379"/>
+            <a:ext cx="716339" cy="644141"/>
+          </a:xfrm>
+          <a:prstGeom prst="ellipse">
+            <a:avLst/>
+          </a:prstGeom>
+        </p:spPr>
+        <p:style>
+          <a:lnRef idx="2">
+            <a:schemeClr val="accent1">
+              <a:shade val="50000"/>
+            </a:schemeClr>
+          </a:lnRef>
+          <a:fillRef idx="1">
+            <a:schemeClr val="accent1"/>
+          </a:fillRef>
+          <a:effectRef idx="0">
+            <a:schemeClr val="accent1"/>
+          </a:effectRef>
+          <a:fontRef idx="minor">
+            <a:schemeClr val="lt1"/>
+          </a:fontRef>
+        </p:style>
+        <p:txBody>
+          <a:bodyPr rtlCol="0" anchor="ctr"/>
+          <a:lstStyle/>
+          <a:p>
+            <a:pPr algn="ctr"/>
+            <a:r>
+              <a:rPr lang="en-US" sz="1200" dirty="0" smtClean="0"/>
+              <a:t>WTA</a:t>
+            </a:r>
+            <a:endParaRPr lang="ru-RU" sz="1200" dirty="0"/>
+          </a:p>
+        </p:txBody>
+      </p:sp>
+      <p:sp>
+        <p:nvSpPr>
+          <p:cNvPr id="83" name="Oval 32"/>
+          <p:cNvSpPr/>
+          <p:nvPr/>
+        </p:nvSpPr>
+        <p:spPr>
+          <a:xfrm>
+            <a:off x="3532344" y="2692026"/>
+            <a:ext cx="716339" cy="644141"/>
+          </a:xfrm>
+          <a:prstGeom prst="ellipse">
+            <a:avLst/>
+          </a:prstGeom>
+        </p:spPr>
+        <p:style>
+          <a:lnRef idx="2">
+            <a:schemeClr val="accent1">
+              <a:shade val="50000"/>
+            </a:schemeClr>
+          </a:lnRef>
+          <a:fillRef idx="1">
+            <a:schemeClr val="accent1"/>
+          </a:fillRef>
+          <a:effectRef idx="0">
+            <a:schemeClr val="accent1"/>
+          </a:effectRef>
+          <a:fontRef idx="minor">
+            <a:schemeClr val="lt1"/>
+          </a:fontRef>
+        </p:style>
+        <p:txBody>
+          <a:bodyPr rtlCol="0" anchor="ctr"/>
+          <a:lstStyle/>
+          <a:p>
+            <a:pPr algn="ctr"/>
+            <a:r>
+              <a:rPr lang="en-US" sz="1200" dirty="0" smtClean="0"/>
+              <a:t>WTA</a:t>
+            </a:r>
+            <a:endParaRPr lang="ru-RU" sz="1200" dirty="0"/>
+          </a:p>
+        </p:txBody>
+      </p:sp>
+      <p:cxnSp>
+        <p:nvCxnSpPr>
+          <p:cNvPr id="26" name="Прямая со стрелкой 25"/>
+          <p:cNvCxnSpPr>
+            <a:stCxn id="82" idx="6"/>
+            <a:endCxn id="83" idx="2"/>
+          </p:cNvCxnSpPr>
+          <p:nvPr/>
+        </p:nvCxnSpPr>
+        <p:spPr>
+          <a:xfrm flipV="1">
+            <a:off x="2638762" y="3014097"/>
+            <a:ext cx="893582" cy="55353"/>
+          </a:xfrm>
+          <a:prstGeom prst="straightConnector1">
+            <a:avLst/>
+          </a:prstGeom>
+          <a:ln>
+            <a:solidFill>
+              <a:schemeClr val="tx1"/>
+            </a:solidFill>
+            <a:headEnd type="triangle"/>
+            <a:tailEnd type="triangle"/>
+          </a:ln>
+        </p:spPr>
+        <p:style>
+          <a:lnRef idx="1">
+            <a:schemeClr val="accent1"/>
+          </a:lnRef>
+          <a:fillRef idx="0">
+            <a:schemeClr val="accent1"/>
+          </a:fillRef>
+          <a:effectRef idx="0">
+            <a:schemeClr val="accent1"/>
+          </a:effectRef>
+          <a:fontRef idx="minor">
+            <a:schemeClr val="tx1"/>
+          </a:fontRef>
+        </p:style>
+      </p:cxnSp>
+      <p:cxnSp>
+        <p:nvCxnSpPr>
+          <p:cNvPr id="86" name="Прямая со стрелкой 85"/>
+          <p:cNvCxnSpPr>
+            <a:stCxn id="82" idx="2"/>
+            <a:endCxn id="81" idx="6"/>
+          </p:cNvCxnSpPr>
+          <p:nvPr/>
+        </p:nvCxnSpPr>
+        <p:spPr>
+          <a:xfrm flipH="1" flipV="1">
+            <a:off x="968061" y="3056893"/>
+            <a:ext cx="954362" cy="12557"/>
+          </a:xfrm>
+          <a:prstGeom prst="straightConnector1">
+            <a:avLst/>
+          </a:prstGeom>
+          <a:ln>
+            <a:solidFill>
+              <a:schemeClr val="tx1"/>
+            </a:solidFill>
+            <a:headEnd type="triangle"/>
+            <a:tailEnd type="triangle"/>
+          </a:ln>
+        </p:spPr>
+        <p:style>
+          <a:lnRef idx="1">
+            <a:schemeClr val="accent1"/>
+          </a:lnRef>
+          <a:fillRef idx="0">
+            <a:schemeClr val="accent1"/>
+          </a:fillRef>
+          <a:effectRef idx="0">
+            <a:schemeClr val="accent1"/>
+          </a:effectRef>
+          <a:fontRef idx="minor">
+            <a:schemeClr val="tx1"/>
+          </a:fontRef>
+        </p:style>
+      </p:cxnSp>
+      <p:cxnSp>
+        <p:nvCxnSpPr>
+          <p:cNvPr id="88" name="Straight Arrow Connector 47"/>
+          <p:cNvCxnSpPr/>
+          <p:nvPr/>
+        </p:nvCxnSpPr>
+        <p:spPr>
+          <a:xfrm flipH="1" flipV="1">
+            <a:off x="609892" y="3397435"/>
+            <a:ext cx="66479" cy="691790"/>
+          </a:xfrm>
+          <a:prstGeom prst="straightConnector1">
+            <a:avLst/>
+          </a:prstGeom>
+          <a:ln w="38100">
+            <a:tailEnd type="triangle"/>
+          </a:ln>
+        </p:spPr>
+        <p:style>
+          <a:lnRef idx="1">
+            <a:schemeClr val="accent1"/>
+          </a:lnRef>
+          <a:fillRef idx="0">
+            <a:schemeClr val="accent1"/>
+          </a:fillRef>
+          <a:effectRef idx="0">
+            <a:schemeClr val="accent1"/>
+          </a:effectRef>
+          <a:fontRef idx="minor">
+            <a:schemeClr val="tx1"/>
+          </a:fontRef>
+        </p:style>
+      </p:cxnSp>
+      <p:cxnSp>
+        <p:nvCxnSpPr>
+          <p:cNvPr id="122" name="Straight Arrow Connector 47"/>
+          <p:cNvCxnSpPr>
+            <a:stCxn id="133" idx="3"/>
+            <a:endCxn id="140" idx="2"/>
+          </p:cNvCxnSpPr>
+          <p:nvPr/>
+        </p:nvCxnSpPr>
+        <p:spPr>
+          <a:xfrm>
+            <a:off x="1838695" y="321459"/>
+            <a:ext cx="624349" cy="349420"/>
+          </a:xfrm>
+          <a:prstGeom prst="straightConnector1">
+            <a:avLst/>
+          </a:prstGeom>
+          <a:ln w="38100">
+            <a:tailEnd type="triangle"/>
+          </a:ln>
+        </p:spPr>
+        <p:style>
+          <a:lnRef idx="1">
+            <a:schemeClr val="accent1"/>
+          </a:lnRef>
+          <a:fillRef idx="0">
+            <a:schemeClr val="accent1"/>
+          </a:fillRef>
+          <a:effectRef idx="0">
+            <a:schemeClr val="accent1"/>
+          </a:effectRef>
+          <a:fontRef idx="minor">
+            <a:schemeClr val="tx1"/>
+          </a:fontRef>
+        </p:style>
+      </p:cxnSp>
+      <p:cxnSp>
+        <p:nvCxnSpPr>
+          <p:cNvPr id="126" name="Straight Arrow Connector 47"/>
+          <p:cNvCxnSpPr>
+            <a:stCxn id="140" idx="4"/>
+            <a:endCxn id="104" idx="0"/>
+          </p:cNvCxnSpPr>
+          <p:nvPr/>
+        </p:nvCxnSpPr>
+        <p:spPr>
+          <a:xfrm>
+            <a:off x="2821214" y="992949"/>
+            <a:ext cx="289216" cy="2378311"/>
+          </a:xfrm>
+          <a:prstGeom prst="straightConnector1">
+            <a:avLst/>
+          </a:prstGeom>
+          <a:ln w="38100">
+            <a:tailEnd type="triangle"/>
+          </a:ln>
+        </p:spPr>
+        <p:style>
+          <a:lnRef idx="1">
+            <a:schemeClr val="accent1"/>
+          </a:lnRef>
+          <a:fillRef idx="0">
+            <a:schemeClr val="accent1"/>
+          </a:fillRef>
+          <a:effectRef idx="0">
+            <a:schemeClr val="accent1"/>
+          </a:effectRef>
+          <a:fontRef idx="minor">
+            <a:schemeClr val="tx1"/>
+          </a:fontRef>
+        </p:style>
+      </p:cxnSp>
+      <p:sp>
+        <p:nvSpPr>
+          <p:cNvPr id="133" name="TextBox 132"/>
+          <p:cNvSpPr txBox="1"/>
+          <p:nvPr/>
+        </p:nvSpPr>
+        <p:spPr>
+          <a:xfrm>
+            <a:off x="709000" y="136793"/>
+            <a:ext cx="1129695" cy="369332"/>
+          </a:xfrm>
+          <a:prstGeom prst="rect">
+            <a:avLst/>
+          </a:prstGeom>
+          <a:noFill/>
+        </p:spPr>
+        <p:txBody>
+          <a:bodyPr wrap="square" rtlCol="0">
+            <a:spAutoFit/>
+          </a:bodyPr>
+          <a:lstStyle/>
+          <a:p>
+            <a:r>
+              <a:rPr lang="en-US" dirty="0" smtClean="0"/>
+              <a:t>REWARD</a:t>
+            </a:r>
+            <a:endParaRPr lang="ru-RU" dirty="0"/>
+          </a:p>
+        </p:txBody>
+      </p:sp>
+      <p:sp>
+        <p:nvSpPr>
+          <p:cNvPr id="140" name="Oval 32"/>
+          <p:cNvSpPr/>
+          <p:nvPr/>
+        </p:nvSpPr>
+        <p:spPr>
+          <a:xfrm>
+            <a:off x="2463044" y="348808"/>
+            <a:ext cx="716339" cy="644141"/>
+          </a:xfrm>
+          <a:prstGeom prst="ellipse">
+            <a:avLst/>
+          </a:prstGeom>
+          <a:ln>
+            <a:solidFill>
+              <a:srgbClr val="FF0000"/>
+            </a:solidFill>
+          </a:ln>
+        </p:spPr>
+        <p:style>
+          <a:lnRef idx="2">
+            <a:schemeClr val="accent1">
+              <a:shade val="50000"/>
+            </a:schemeClr>
+          </a:lnRef>
+          <a:fillRef idx="1">
+            <a:schemeClr val="accent1"/>
+          </a:fillRef>
+          <a:effectRef idx="0">
+            <a:schemeClr val="accent1"/>
+          </a:effectRef>
+          <a:fontRef idx="minor">
+            <a:schemeClr val="lt1"/>
+          </a:fontRef>
+        </p:style>
+        <p:txBody>
+          <a:bodyPr rtlCol="0" anchor="ctr"/>
+          <a:lstStyle/>
+          <a:p>
+            <a:pPr algn="ctr"/>
+            <a:r>
+              <a:rPr lang="en-US" sz="1100" dirty="0" smtClean="0"/>
+              <a:t>REWBIAS</a:t>
+            </a:r>
+            <a:endParaRPr lang="ru-RU" sz="1100" dirty="0"/>
+          </a:p>
+        </p:txBody>
+      </p:sp>
+      <p:cxnSp>
+        <p:nvCxnSpPr>
+          <p:cNvPr id="144" name="Straight Arrow Connector 31"/>
+          <p:cNvCxnSpPr>
+            <a:stCxn id="99" idx="3"/>
+            <a:endCxn id="77" idx="7"/>
+          </p:cNvCxnSpPr>
+          <p:nvPr/>
+        </p:nvCxnSpPr>
+        <p:spPr>
+          <a:xfrm flipH="1">
+            <a:off x="929635" y="3862347"/>
+            <a:ext cx="297626" cy="302738"/>
+          </a:xfrm>
+          <a:prstGeom prst="straightConnector1">
+            <a:avLst/>
+          </a:prstGeom>
+          <a:ln w="38100">
+            <a:solidFill>
+              <a:schemeClr val="accent1"/>
+            </a:solidFill>
+            <a:prstDash val="dash"/>
+            <a:tailEnd type="triangle"/>
+          </a:ln>
+        </p:spPr>
+        <p:style>
+          <a:lnRef idx="1">
+            <a:schemeClr val="accent1"/>
+          </a:lnRef>
+          <a:fillRef idx="0">
+            <a:schemeClr val="accent1"/>
+          </a:fillRef>
+          <a:effectRef idx="0">
+            <a:schemeClr val="accent1"/>
+          </a:effectRef>
+          <a:fontRef idx="minor">
+            <a:schemeClr val="tx1"/>
+          </a:fontRef>
+        </p:style>
+      </p:cxnSp>
+      <p:cxnSp>
+        <p:nvCxnSpPr>
+          <p:cNvPr id="178" name="Straight Arrow Connector 31"/>
+          <p:cNvCxnSpPr>
+            <a:stCxn id="104" idx="3"/>
+            <a:endCxn id="79" idx="7"/>
+          </p:cNvCxnSpPr>
+          <p:nvPr/>
+        </p:nvCxnSpPr>
+        <p:spPr>
+          <a:xfrm flipH="1">
+            <a:off x="2328907" y="3921069"/>
+            <a:ext cx="528258" cy="314396"/>
+          </a:xfrm>
+          <a:prstGeom prst="straightConnector1">
+            <a:avLst/>
+          </a:prstGeom>
+          <a:ln w="38100">
+            <a:solidFill>
+              <a:schemeClr val="accent1"/>
+            </a:solidFill>
+            <a:prstDash val="dash"/>
+            <a:tailEnd type="triangle"/>
+          </a:ln>
+        </p:spPr>
+        <p:style>
+          <a:lnRef idx="1">
+            <a:schemeClr val="accent1"/>
+          </a:lnRef>
+          <a:fillRef idx="0">
+            <a:schemeClr val="accent1"/>
+          </a:fillRef>
+          <a:effectRef idx="0">
+            <a:schemeClr val="accent1"/>
+          </a:effectRef>
+          <a:fontRef idx="minor">
+            <a:schemeClr val="tx1"/>
+          </a:fontRef>
+        </p:style>
+      </p:cxnSp>
+      <p:cxnSp>
+        <p:nvCxnSpPr>
+          <p:cNvPr id="181" name="Straight Arrow Connector 31"/>
+          <p:cNvCxnSpPr>
+            <a:stCxn id="102" idx="3"/>
+            <a:endCxn id="80" idx="7"/>
+          </p:cNvCxnSpPr>
+          <p:nvPr/>
+        </p:nvCxnSpPr>
+        <p:spPr>
+          <a:xfrm flipH="1">
+            <a:off x="4174353" y="3426612"/>
+            <a:ext cx="460724" cy="703576"/>
+          </a:xfrm>
+          <a:prstGeom prst="straightConnector1">
+            <a:avLst/>
+          </a:prstGeom>
+          <a:ln w="38100">
+            <a:solidFill>
+              <a:schemeClr val="accent1"/>
+            </a:solidFill>
+            <a:prstDash val="dash"/>
+            <a:tailEnd type="triangle"/>
+          </a:ln>
+        </p:spPr>
+        <p:style>
+          <a:lnRef idx="1">
+            <a:schemeClr val="accent1"/>
+          </a:lnRef>
+          <a:fillRef idx="0">
+            <a:schemeClr val="accent1"/>
+          </a:fillRef>
+          <a:effectRef idx="0">
+            <a:schemeClr val="accent1"/>
+          </a:effectRef>
+          <a:fontRef idx="minor">
+            <a:schemeClr val="tx1"/>
+          </a:fontRef>
+        </p:style>
+      </p:cxnSp>
+      <p:cxnSp>
+        <p:nvCxnSpPr>
+          <p:cNvPr id="132" name="Straight Arrow Connector 47"/>
+          <p:cNvCxnSpPr>
+            <a:stCxn id="140" idx="3"/>
+            <a:endCxn id="99" idx="0"/>
+          </p:cNvCxnSpPr>
+          <p:nvPr/>
+        </p:nvCxnSpPr>
+        <p:spPr>
+          <a:xfrm flipH="1">
+            <a:off x="1480526" y="898617"/>
+            <a:ext cx="1087423" cy="2413921"/>
+          </a:xfrm>
+          <a:prstGeom prst="straightConnector1">
+            <a:avLst/>
+          </a:prstGeom>
+          <a:ln w="38100">
+            <a:tailEnd type="triangle"/>
+          </a:ln>
+        </p:spPr>
+        <p:style>
+          <a:lnRef idx="1">
+            <a:schemeClr val="accent1"/>
+          </a:lnRef>
+          <a:fillRef idx="0">
+            <a:schemeClr val="accent1"/>
+          </a:fillRef>
+          <a:effectRef idx="0">
+            <a:schemeClr val="accent1"/>
+          </a:effectRef>
+          <a:fontRef idx="minor">
+            <a:schemeClr val="tx1"/>
+          </a:fontRef>
+        </p:style>
+      </p:cxnSp>
+      <p:cxnSp>
+        <p:nvCxnSpPr>
+          <p:cNvPr id="146" name="Straight Arrow Connector 47"/>
+          <p:cNvCxnSpPr>
+            <a:stCxn id="79" idx="0"/>
+            <a:endCxn id="82" idx="4"/>
+          </p:cNvCxnSpPr>
+          <p:nvPr/>
+        </p:nvCxnSpPr>
+        <p:spPr>
+          <a:xfrm flipV="1">
+            <a:off x="2075643" y="3391520"/>
+            <a:ext cx="204950" cy="749613"/>
+          </a:xfrm>
+          <a:prstGeom prst="straightConnector1">
+            <a:avLst/>
+          </a:prstGeom>
+          <a:ln w="38100">
+            <a:tailEnd type="triangle"/>
+          </a:ln>
+        </p:spPr>
+        <p:style>
+          <a:lnRef idx="1">
+            <a:schemeClr val="accent1"/>
+          </a:lnRef>
+          <a:fillRef idx="0">
+            <a:schemeClr val="accent1"/>
+          </a:fillRef>
+          <a:effectRef idx="0">
+            <a:schemeClr val="accent1"/>
+          </a:effectRef>
+          <a:fontRef idx="minor">
+            <a:schemeClr val="tx1"/>
+          </a:fontRef>
+        </p:style>
+      </p:cxnSp>
+      <p:cxnSp>
+        <p:nvCxnSpPr>
+          <p:cNvPr id="149" name="Straight Arrow Connector 47"/>
+          <p:cNvCxnSpPr>
+            <a:stCxn id="80" idx="0"/>
+            <a:endCxn id="83" idx="4"/>
+          </p:cNvCxnSpPr>
+          <p:nvPr/>
+        </p:nvCxnSpPr>
+        <p:spPr>
+          <a:xfrm flipH="1" flipV="1">
+            <a:off x="3890514" y="3336167"/>
+            <a:ext cx="30575" cy="699689"/>
+          </a:xfrm>
+          <a:prstGeom prst="straightConnector1">
+            <a:avLst/>
+          </a:prstGeom>
+          <a:ln w="38100">
+            <a:tailEnd type="triangle"/>
+          </a:ln>
+        </p:spPr>
+        <p:style>
+          <a:lnRef idx="1">
+            <a:schemeClr val="accent1"/>
+          </a:lnRef>
+          <a:fillRef idx="0">
+            <a:schemeClr val="accent1"/>
+          </a:fillRef>
+          <a:effectRef idx="0">
+            <a:schemeClr val="accent1"/>
+          </a:effectRef>
+          <a:fontRef idx="minor">
+            <a:schemeClr val="tx1"/>
+          </a:fontRef>
+        </p:style>
+      </p:cxnSp>
+      <p:cxnSp>
+        <p:nvCxnSpPr>
+          <p:cNvPr id="73" name="Прямая со стрелкой 72"/>
+          <p:cNvCxnSpPr>
+            <a:stCxn id="81" idx="7"/>
+            <a:endCxn id="140" idx="2"/>
+          </p:cNvCxnSpPr>
+          <p:nvPr/>
+        </p:nvCxnSpPr>
+        <p:spPr>
+          <a:xfrm flipV="1">
+            <a:off x="863156" y="670879"/>
+            <a:ext cx="1599888" cy="2158275"/>
+          </a:xfrm>
+          <a:prstGeom prst="straightConnector1">
+            <a:avLst/>
+          </a:prstGeom>
+          <a:ln>
+            <a:solidFill>
+              <a:schemeClr val="tx1"/>
+            </a:solidFill>
+            <a:headEnd type="none"/>
+            <a:tailEnd type="triangle"/>
+          </a:ln>
+        </p:spPr>
+        <p:style>
+          <a:lnRef idx="1">
+            <a:schemeClr val="accent1"/>
+          </a:lnRef>
+          <a:fillRef idx="0">
+            <a:schemeClr val="accent1"/>
+          </a:fillRef>
+          <a:effectRef idx="0">
+            <a:schemeClr val="accent1"/>
+          </a:effectRef>
+          <a:fontRef idx="minor">
+            <a:schemeClr val="tx1"/>
+          </a:fontRef>
+        </p:style>
+      </p:cxnSp>
+      <p:cxnSp>
+        <p:nvCxnSpPr>
+          <p:cNvPr id="85" name="Прямая со стрелкой 84"/>
+          <p:cNvCxnSpPr>
+            <a:stCxn id="82" idx="1"/>
+            <a:endCxn id="140" idx="4"/>
+          </p:cNvCxnSpPr>
+          <p:nvPr/>
+        </p:nvCxnSpPr>
+        <p:spPr>
+          <a:xfrm flipV="1">
+            <a:off x="2027328" y="992949"/>
+            <a:ext cx="793886" cy="1848762"/>
+          </a:xfrm>
+          <a:prstGeom prst="straightConnector1">
+            <a:avLst/>
+          </a:prstGeom>
+          <a:ln>
+            <a:solidFill>
+              <a:schemeClr val="tx1"/>
+            </a:solidFill>
+            <a:headEnd type="none"/>
+            <a:tailEnd type="triangle"/>
+          </a:ln>
+        </p:spPr>
+        <p:style>
+          <a:lnRef idx="1">
+            <a:schemeClr val="accent1"/>
+          </a:lnRef>
+          <a:fillRef idx="0">
+            <a:schemeClr val="accent1"/>
+          </a:fillRef>
+          <a:effectRef idx="0">
+            <a:schemeClr val="accent1"/>
+          </a:effectRef>
+          <a:fontRef idx="minor">
+            <a:schemeClr val="tx1"/>
+          </a:fontRef>
+        </p:style>
+      </p:cxnSp>
+      <p:cxnSp>
+        <p:nvCxnSpPr>
+          <p:cNvPr id="93" name="Прямая со стрелкой 92"/>
+          <p:cNvCxnSpPr>
+            <a:stCxn id="83" idx="0"/>
+            <a:endCxn id="140" idx="5"/>
+          </p:cNvCxnSpPr>
+          <p:nvPr/>
+        </p:nvCxnSpPr>
+        <p:spPr>
+          <a:xfrm flipH="1" flipV="1">
+            <a:off x="3074478" y="898617"/>
+            <a:ext cx="816036" cy="1793409"/>
+          </a:xfrm>
+          <a:prstGeom prst="straightConnector1">
+            <a:avLst/>
+          </a:prstGeom>
+          <a:ln>
+            <a:solidFill>
+              <a:schemeClr val="tx1"/>
+            </a:solidFill>
+            <a:headEnd type="none"/>
+            <a:tailEnd type="triangle"/>
+          </a:ln>
+        </p:spPr>
+        <p:style>
+          <a:lnRef idx="1">
+            <a:schemeClr val="accent1"/>
+          </a:lnRef>
+          <a:fillRef idx="0">
+            <a:schemeClr val="accent1"/>
+          </a:fillRef>
+          <a:effectRef idx="0">
+            <a:schemeClr val="accent1"/>
+          </a:effectRef>
+          <a:fontRef idx="minor">
+            <a:schemeClr val="tx1"/>
+          </a:fontRef>
+        </p:style>
+      </p:cxnSp>
+      <p:sp>
+        <p:nvSpPr>
+          <p:cNvPr id="89" name="Oval 32"/>
+          <p:cNvSpPr/>
+          <p:nvPr/>
+        </p:nvSpPr>
+        <p:spPr>
+          <a:xfrm>
+            <a:off x="5353788" y="1813861"/>
+            <a:ext cx="716339" cy="644141"/>
+          </a:xfrm>
+          <a:prstGeom prst="ellipse">
+            <a:avLst/>
+          </a:prstGeom>
+        </p:spPr>
+        <p:style>
+          <a:lnRef idx="2">
+            <a:schemeClr val="accent1">
+              <a:shade val="50000"/>
+            </a:schemeClr>
+          </a:lnRef>
+          <a:fillRef idx="1">
+            <a:schemeClr val="accent1"/>
+          </a:fillRef>
+          <a:effectRef idx="0">
+            <a:schemeClr val="accent1"/>
+          </a:effectRef>
+          <a:fontRef idx="minor">
+            <a:schemeClr val="lt1"/>
+          </a:fontRef>
+        </p:style>
+        <p:txBody>
+          <a:bodyPr rtlCol="0" anchor="ctr"/>
+          <a:lstStyle/>
+          <a:p>
+            <a:pPr algn="ctr"/>
+            <a:r>
+              <a:rPr lang="en-US" sz="2000" dirty="0" smtClean="0"/>
+              <a:t>OR</a:t>
+            </a:r>
+            <a:endParaRPr lang="ru-RU" sz="2000" dirty="0"/>
+          </a:p>
+        </p:txBody>
+      </p:sp>
+      <p:cxnSp>
+        <p:nvCxnSpPr>
+          <p:cNvPr id="90" name="Straight Arrow Connector 47"/>
+          <p:cNvCxnSpPr>
+            <a:endCxn id="89" idx="2"/>
+          </p:cNvCxnSpPr>
+          <p:nvPr/>
+        </p:nvCxnSpPr>
+        <p:spPr>
+          <a:xfrm flipV="1">
+            <a:off x="609892" y="2135932"/>
+            <a:ext cx="4743896" cy="617362"/>
+          </a:xfrm>
+          <a:prstGeom prst="straightConnector1">
+            <a:avLst/>
+          </a:prstGeom>
+          <a:ln w="38100">
+            <a:tailEnd type="triangle"/>
+          </a:ln>
+        </p:spPr>
+        <p:style>
+          <a:lnRef idx="1">
+            <a:schemeClr val="accent1"/>
+          </a:lnRef>
+          <a:fillRef idx="0">
+            <a:schemeClr val="accent1"/>
+          </a:fillRef>
+          <a:effectRef idx="0">
+            <a:schemeClr val="accent1"/>
+          </a:effectRef>
+          <a:fontRef idx="minor">
+            <a:schemeClr val="tx1"/>
+          </a:fontRef>
+        </p:style>
+      </p:cxnSp>
+      <p:cxnSp>
+        <p:nvCxnSpPr>
+          <p:cNvPr id="97" name="Straight Arrow Connector 47"/>
+          <p:cNvCxnSpPr>
+            <a:stCxn id="82" idx="0"/>
+            <a:endCxn id="89" idx="2"/>
+          </p:cNvCxnSpPr>
+          <p:nvPr/>
+        </p:nvCxnSpPr>
+        <p:spPr>
+          <a:xfrm flipV="1">
+            <a:off x="2280593" y="2135932"/>
+            <a:ext cx="3073195" cy="611447"/>
+          </a:xfrm>
+          <a:prstGeom prst="straightConnector1">
+            <a:avLst/>
+          </a:prstGeom>
+          <a:ln w="38100">
+            <a:tailEnd type="triangle"/>
+          </a:ln>
+        </p:spPr>
+        <p:style>
+          <a:lnRef idx="1">
+            <a:schemeClr val="accent1"/>
+          </a:lnRef>
+          <a:fillRef idx="0">
+            <a:schemeClr val="accent1"/>
+          </a:fillRef>
+          <a:effectRef idx="0">
+            <a:schemeClr val="accent1"/>
+          </a:effectRef>
+          <a:fontRef idx="minor">
+            <a:schemeClr val="tx1"/>
+          </a:fontRef>
+        </p:style>
+      </p:cxnSp>
+      <p:cxnSp>
+        <p:nvCxnSpPr>
+          <p:cNvPr id="100" name="Straight Arrow Connector 47"/>
+          <p:cNvCxnSpPr>
+            <a:stCxn id="83" idx="7"/>
+            <a:endCxn id="89" idx="2"/>
+          </p:cNvCxnSpPr>
+          <p:nvPr/>
+        </p:nvCxnSpPr>
+        <p:spPr>
+          <a:xfrm flipV="1">
+            <a:off x="4143778" y="2135932"/>
+            <a:ext cx="1210010" cy="650426"/>
+          </a:xfrm>
+          <a:prstGeom prst="straightConnector1">
+            <a:avLst/>
+          </a:prstGeom>
+          <a:ln w="38100">
+            <a:tailEnd type="triangle"/>
+          </a:ln>
+        </p:spPr>
+        <p:style>
+          <a:lnRef idx="1">
+            <a:schemeClr val="accent1"/>
+          </a:lnRef>
+          <a:fillRef idx="0">
+            <a:schemeClr val="accent1"/>
+          </a:fillRef>
+          <a:effectRef idx="0">
+            <a:schemeClr val="accent1"/>
+          </a:effectRef>
+          <a:fontRef idx="minor">
+            <a:schemeClr val="tx1"/>
+          </a:fontRef>
+        </p:style>
+      </p:cxnSp>
+      <p:sp>
+        <p:nvSpPr>
+          <p:cNvPr id="112" name="Oval 32"/>
+          <p:cNvSpPr/>
+          <p:nvPr/>
+        </p:nvSpPr>
+        <p:spPr>
+          <a:xfrm>
+            <a:off x="5477530" y="229876"/>
+            <a:ext cx="716339" cy="644141"/>
+          </a:xfrm>
+          <a:prstGeom prst="ellipse">
+            <a:avLst/>
+          </a:prstGeom>
+        </p:spPr>
+        <p:style>
+          <a:lnRef idx="2">
+            <a:schemeClr val="accent1">
+              <a:shade val="50000"/>
+            </a:schemeClr>
+          </a:lnRef>
+          <a:fillRef idx="1">
+            <a:schemeClr val="accent1"/>
+          </a:fillRef>
+          <a:effectRef idx="0">
+            <a:schemeClr val="accent1"/>
+          </a:effectRef>
+          <a:fontRef idx="minor">
+            <a:schemeClr val="lt1"/>
+          </a:fontRef>
+        </p:style>
+        <p:txBody>
+          <a:bodyPr rtlCol="0" anchor="ctr"/>
+          <a:lstStyle/>
+          <a:p>
+            <a:pPr algn="ctr"/>
+            <a:r>
+              <a:rPr lang="en-US" sz="700" dirty="0" smtClean="0"/>
+              <a:t>SECREW</a:t>
+            </a:r>
+            <a:endParaRPr lang="ru-RU" sz="700" dirty="0"/>
+          </a:p>
+        </p:txBody>
+      </p:sp>
+      <p:cxnSp>
+        <p:nvCxnSpPr>
+          <p:cNvPr id="113" name="Straight Arrow Connector 47"/>
+          <p:cNvCxnSpPr>
+            <a:stCxn id="89" idx="1"/>
+            <a:endCxn id="112" idx="2"/>
+          </p:cNvCxnSpPr>
+          <p:nvPr/>
+        </p:nvCxnSpPr>
+        <p:spPr>
+          <a:xfrm flipV="1">
+            <a:off x="5458693" y="551947"/>
+            <a:ext cx="18837" cy="1356246"/>
+          </a:xfrm>
+          <a:prstGeom prst="straightConnector1">
+            <a:avLst/>
+          </a:prstGeom>
+          <a:ln w="38100">
+            <a:tailEnd type="triangle"/>
+          </a:ln>
+        </p:spPr>
+        <p:style>
+          <a:lnRef idx="1">
+            <a:schemeClr val="accent1"/>
+          </a:lnRef>
+          <a:fillRef idx="0">
+            <a:schemeClr val="accent1"/>
+          </a:fillRef>
+          <a:effectRef idx="0">
+            <a:schemeClr val="accent1"/>
+          </a:effectRef>
+          <a:fontRef idx="minor">
+            <a:schemeClr val="tx1"/>
+          </a:fontRef>
+        </p:style>
+      </p:cxnSp>
+      <p:cxnSp>
+        <p:nvCxnSpPr>
+          <p:cNvPr id="116" name="Прямая со стрелкой 115"/>
+          <p:cNvCxnSpPr>
+            <a:stCxn id="89" idx="0"/>
+            <a:endCxn id="112" idx="4"/>
+          </p:cNvCxnSpPr>
+          <p:nvPr/>
+        </p:nvCxnSpPr>
+        <p:spPr>
+          <a:xfrm flipV="1">
+            <a:off x="5711958" y="874017"/>
+            <a:ext cx="123742" cy="939844"/>
+          </a:xfrm>
+          <a:prstGeom prst="straightConnector1">
+            <a:avLst/>
+          </a:prstGeom>
+          <a:ln>
+            <a:solidFill>
+              <a:schemeClr val="tx1">
+                <a:alpha val="50000"/>
+              </a:schemeClr>
+            </a:solidFill>
+            <a:headEnd type="none"/>
+            <a:tailEnd type="triangle"/>
+          </a:ln>
+        </p:spPr>
+        <p:style>
+          <a:lnRef idx="1">
+            <a:schemeClr val="accent1"/>
+          </a:lnRef>
+          <a:fillRef idx="0">
+            <a:schemeClr val="accent1"/>
+          </a:fillRef>
+          <a:effectRef idx="0">
+            <a:schemeClr val="accent1"/>
+          </a:effectRef>
+          <a:fontRef idx="minor">
+            <a:schemeClr val="tx1"/>
+          </a:fontRef>
+        </p:style>
+      </p:cxnSp>
+      <p:sp>
+        <p:nvSpPr>
+          <p:cNvPr id="172" name="Oval 32"/>
+          <p:cNvSpPr/>
+          <p:nvPr/>
+        </p:nvSpPr>
+        <p:spPr>
+          <a:xfrm>
+            <a:off x="10682559" y="1527019"/>
+            <a:ext cx="716339" cy="644141"/>
+          </a:xfrm>
+          <a:prstGeom prst="ellipse">
+            <a:avLst/>
+          </a:prstGeom>
+        </p:spPr>
+        <p:style>
+          <a:lnRef idx="2">
+            <a:schemeClr val="accent1">
+              <a:shade val="50000"/>
+            </a:schemeClr>
+          </a:lnRef>
+          <a:fillRef idx="1">
+            <a:schemeClr val="accent1"/>
+          </a:fillRef>
+          <a:effectRef idx="0">
+            <a:schemeClr val="accent1"/>
+          </a:effectRef>
+          <a:fontRef idx="minor">
+            <a:schemeClr val="lt1"/>
+          </a:fontRef>
+        </p:style>
+        <p:txBody>
+          <a:bodyPr rtlCol="0" anchor="ctr"/>
+          <a:lstStyle/>
+          <a:p>
+            <a:pPr algn="ctr"/>
+            <a:r>
+              <a:rPr lang="en-US" sz="2000" dirty="0" smtClean="0"/>
+              <a:t>OR</a:t>
+            </a:r>
+            <a:endParaRPr lang="ru-RU" sz="2000" dirty="0"/>
+          </a:p>
+        </p:txBody>
+      </p:sp>
+      <p:sp>
+        <p:nvSpPr>
+          <p:cNvPr id="177" name="Oval 32"/>
+          <p:cNvSpPr/>
+          <p:nvPr/>
+        </p:nvSpPr>
+        <p:spPr>
+          <a:xfrm>
+            <a:off x="10877563" y="156052"/>
+            <a:ext cx="716339" cy="644141"/>
+          </a:xfrm>
+          <a:prstGeom prst="ellipse">
+            <a:avLst/>
+          </a:prstGeom>
+        </p:spPr>
+        <p:style>
+          <a:lnRef idx="2">
+            <a:schemeClr val="accent1">
+              <a:shade val="50000"/>
+            </a:schemeClr>
+          </a:lnRef>
+          <a:fillRef idx="1">
+            <a:schemeClr val="accent1"/>
+          </a:fillRef>
+          <a:effectRef idx="0">
+            <a:schemeClr val="accent1"/>
+          </a:effectRef>
+          <a:fontRef idx="minor">
+            <a:schemeClr val="lt1"/>
+          </a:fontRef>
+        </p:style>
+        <p:txBody>
+          <a:bodyPr rtlCol="0" anchor="ctr"/>
+          <a:lstStyle/>
+          <a:p>
+            <a:pPr algn="ctr"/>
+            <a:r>
+              <a:rPr lang="en-US" sz="700" dirty="0" smtClean="0"/>
+              <a:t>SECREW</a:t>
+            </a:r>
+            <a:endParaRPr lang="ru-RU" sz="700" dirty="0"/>
+          </a:p>
+        </p:txBody>
+      </p:sp>
+      <p:cxnSp>
+        <p:nvCxnSpPr>
+          <p:cNvPr id="180" name="Straight Arrow Connector 47"/>
+          <p:cNvCxnSpPr>
+            <a:stCxn id="172" idx="1"/>
+            <a:endCxn id="177" idx="2"/>
+          </p:cNvCxnSpPr>
+          <p:nvPr/>
+        </p:nvCxnSpPr>
+        <p:spPr>
+          <a:xfrm flipV="1">
+            <a:off x="10787464" y="478123"/>
+            <a:ext cx="90099" cy="1143228"/>
+          </a:xfrm>
+          <a:prstGeom prst="straightConnector1">
+            <a:avLst/>
+          </a:prstGeom>
+          <a:ln w="38100">
+            <a:tailEnd type="triangle"/>
+          </a:ln>
+        </p:spPr>
+        <p:style>
+          <a:lnRef idx="1">
+            <a:schemeClr val="accent1"/>
+          </a:lnRef>
+          <a:fillRef idx="0">
+            <a:schemeClr val="accent1"/>
+          </a:fillRef>
+          <a:effectRef idx="0">
+            <a:schemeClr val="accent1"/>
+          </a:effectRef>
+          <a:fontRef idx="minor">
+            <a:schemeClr val="tx1"/>
+          </a:fontRef>
+        </p:style>
+      </p:cxnSp>
+      <p:cxnSp>
+        <p:nvCxnSpPr>
+          <p:cNvPr id="182" name="Прямая со стрелкой 181"/>
+          <p:cNvCxnSpPr>
+            <a:stCxn id="172" idx="0"/>
+            <a:endCxn id="177" idx="4"/>
+          </p:cNvCxnSpPr>
+          <p:nvPr/>
+        </p:nvCxnSpPr>
+        <p:spPr>
+          <a:xfrm flipV="1">
+            <a:off x="11040729" y="800193"/>
+            <a:ext cx="195004" cy="726826"/>
+          </a:xfrm>
+          <a:prstGeom prst="straightConnector1">
+            <a:avLst/>
+          </a:prstGeom>
+          <a:ln>
+            <a:solidFill>
+              <a:schemeClr val="tx1">
+                <a:alpha val="50000"/>
+              </a:schemeClr>
+            </a:solidFill>
+            <a:headEnd type="none"/>
+            <a:tailEnd type="triangle"/>
+          </a:ln>
+        </p:spPr>
+        <p:style>
+          <a:lnRef idx="1">
+            <a:schemeClr val="accent1"/>
+          </a:lnRef>
+          <a:fillRef idx="0">
+            <a:schemeClr val="accent1"/>
+          </a:fillRef>
+          <a:effectRef idx="0">
+            <a:schemeClr val="accent1"/>
+          </a:effectRef>
+          <a:fontRef idx="minor">
+            <a:schemeClr val="tx1"/>
+          </a:fontRef>
+        </p:style>
+      </p:cxnSp>
+      <p:sp>
+        <p:nvSpPr>
+          <p:cNvPr id="189" name="TextBox 188"/>
+          <p:cNvSpPr txBox="1"/>
+          <p:nvPr/>
+        </p:nvSpPr>
+        <p:spPr>
+          <a:xfrm>
+            <a:off x="11446076" y="2326420"/>
+            <a:ext cx="432389" cy="1015663"/>
+          </a:xfrm>
+          <a:prstGeom prst="rect">
+            <a:avLst/>
+          </a:prstGeom>
+          <a:noFill/>
+        </p:spPr>
+        <p:txBody>
+          <a:bodyPr wrap="square" rtlCol="0">
+            <a:spAutoFit/>
+          </a:bodyPr>
+          <a:lstStyle/>
+          <a:p>
+            <a:r>
+              <a:rPr lang="en-US" sz="6000" b="1" dirty="0" smtClean="0"/>
+              <a:t>…</a:t>
+            </a:r>
+            <a:endParaRPr lang="ru-RU" sz="6000" b="1" dirty="0"/>
+          </a:p>
+        </p:txBody>
+      </p:sp>
+      <p:cxnSp>
+        <p:nvCxnSpPr>
+          <p:cNvPr id="190" name="Straight Connector 8"/>
+          <p:cNvCxnSpPr>
+            <a:endCxn id="210" idx="2"/>
+          </p:cNvCxnSpPr>
+          <p:nvPr/>
+        </p:nvCxnSpPr>
+        <p:spPr>
+          <a:xfrm flipV="1">
+            <a:off x="609891" y="4434517"/>
+            <a:ext cx="5168545" cy="1294239"/>
+          </a:xfrm>
+          <a:prstGeom prst="line">
+            <a:avLst/>
+          </a:prstGeom>
+        </p:spPr>
+        <p:style>
+          <a:lnRef idx="1">
+            <a:schemeClr val="accent1"/>
+          </a:lnRef>
+          <a:fillRef idx="0">
+            <a:schemeClr val="accent1"/>
+          </a:fillRef>
+          <a:effectRef idx="0">
+            <a:schemeClr val="accent1"/>
+          </a:effectRef>
+          <a:fontRef idx="minor">
+            <a:schemeClr val="tx1"/>
+          </a:fontRef>
+        </p:style>
+      </p:cxnSp>
+      <p:cxnSp>
+        <p:nvCxnSpPr>
+          <p:cNvPr id="193" name="Straight Connector 8"/>
+          <p:cNvCxnSpPr>
+            <a:endCxn id="211" idx="2"/>
+          </p:cNvCxnSpPr>
+          <p:nvPr/>
+        </p:nvCxnSpPr>
+        <p:spPr>
+          <a:xfrm flipV="1">
+            <a:off x="609892" y="4504897"/>
+            <a:ext cx="6567816" cy="1244315"/>
+          </a:xfrm>
+          <a:prstGeom prst="line">
+            <a:avLst/>
+          </a:prstGeom>
+        </p:spPr>
+        <p:style>
+          <a:lnRef idx="1">
+            <a:schemeClr val="accent1"/>
+          </a:lnRef>
+          <a:fillRef idx="0">
+            <a:schemeClr val="accent1"/>
+          </a:fillRef>
+          <a:effectRef idx="0">
+            <a:schemeClr val="accent1"/>
+          </a:effectRef>
+          <a:fontRef idx="minor">
+            <a:schemeClr val="tx1"/>
+          </a:fontRef>
+        </p:style>
+      </p:cxnSp>
+      <p:cxnSp>
+        <p:nvCxnSpPr>
+          <p:cNvPr id="197" name="Straight Connector 8"/>
+          <p:cNvCxnSpPr>
+            <a:endCxn id="212" idx="2"/>
+          </p:cNvCxnSpPr>
+          <p:nvPr/>
+        </p:nvCxnSpPr>
+        <p:spPr>
+          <a:xfrm flipV="1">
+            <a:off x="609889" y="4399620"/>
+            <a:ext cx="8413265" cy="1359625"/>
+          </a:xfrm>
+          <a:prstGeom prst="line">
+            <a:avLst/>
+          </a:prstGeom>
+        </p:spPr>
+        <p:style>
+          <a:lnRef idx="1">
+            <a:schemeClr val="accent1"/>
+          </a:lnRef>
+          <a:fillRef idx="0">
+            <a:schemeClr val="accent1"/>
+          </a:fillRef>
+          <a:effectRef idx="0">
+            <a:schemeClr val="accent1"/>
+          </a:effectRef>
+          <a:fontRef idx="minor">
+            <a:schemeClr val="tx1"/>
+          </a:fontRef>
+        </p:style>
+      </p:cxnSp>
+      <p:cxnSp>
+        <p:nvCxnSpPr>
+          <p:cNvPr id="200" name="Straight Connector 8"/>
+          <p:cNvCxnSpPr>
+            <a:endCxn id="210" idx="6"/>
+          </p:cNvCxnSpPr>
+          <p:nvPr/>
+        </p:nvCxnSpPr>
+        <p:spPr>
+          <a:xfrm flipH="1" flipV="1">
+            <a:off x="6494775" y="4434517"/>
+            <a:ext cx="5057154" cy="1335149"/>
+          </a:xfrm>
+          <a:prstGeom prst="line">
+            <a:avLst/>
+          </a:prstGeom>
+        </p:spPr>
+        <p:style>
+          <a:lnRef idx="1">
+            <a:schemeClr val="accent1"/>
+          </a:lnRef>
+          <a:fillRef idx="0">
+            <a:schemeClr val="accent1"/>
+          </a:fillRef>
+          <a:effectRef idx="0">
+            <a:schemeClr val="accent1"/>
+          </a:effectRef>
+          <a:fontRef idx="minor">
+            <a:schemeClr val="tx1"/>
+          </a:fontRef>
+        </p:style>
+      </p:cxnSp>
+      <p:cxnSp>
+        <p:nvCxnSpPr>
+          <p:cNvPr id="203" name="Straight Connector 8"/>
+          <p:cNvCxnSpPr>
+            <a:endCxn id="211" idx="6"/>
+          </p:cNvCxnSpPr>
+          <p:nvPr/>
+        </p:nvCxnSpPr>
+        <p:spPr>
+          <a:xfrm flipH="1" flipV="1">
+            <a:off x="7894047" y="4504897"/>
+            <a:ext cx="3699856" cy="1254347"/>
+          </a:xfrm>
+          <a:prstGeom prst="line">
+            <a:avLst/>
+          </a:prstGeom>
+        </p:spPr>
+        <p:style>
+          <a:lnRef idx="1">
+            <a:schemeClr val="accent1"/>
+          </a:lnRef>
+          <a:fillRef idx="0">
+            <a:schemeClr val="accent1"/>
+          </a:fillRef>
+          <a:effectRef idx="0">
+            <a:schemeClr val="accent1"/>
+          </a:effectRef>
+          <a:fontRef idx="minor">
+            <a:schemeClr val="tx1"/>
+          </a:fontRef>
+        </p:style>
+      </p:cxnSp>
+      <p:cxnSp>
+        <p:nvCxnSpPr>
+          <p:cNvPr id="206" name="Straight Connector 8"/>
+          <p:cNvCxnSpPr>
+            <a:endCxn id="212" idx="6"/>
+          </p:cNvCxnSpPr>
+          <p:nvPr/>
+        </p:nvCxnSpPr>
+        <p:spPr>
+          <a:xfrm flipH="1" flipV="1">
+            <a:off x="9739493" y="4399620"/>
+            <a:ext cx="1854410" cy="1369657"/>
+          </a:xfrm>
+          <a:prstGeom prst="line">
+            <a:avLst/>
+          </a:prstGeom>
+        </p:spPr>
+        <p:style>
+          <a:lnRef idx="1">
+            <a:schemeClr val="accent1"/>
+          </a:lnRef>
+          <a:fillRef idx="0">
+            <a:schemeClr val="accent1"/>
+          </a:fillRef>
+          <a:effectRef idx="0">
+            <a:schemeClr val="accent1"/>
+          </a:effectRef>
+          <a:fontRef idx="minor">
+            <a:schemeClr val="tx1"/>
+          </a:fontRef>
+        </p:style>
+      </p:cxnSp>
+      <p:cxnSp>
+        <p:nvCxnSpPr>
+          <p:cNvPr id="209" name="Прямая со стрелкой 208"/>
+          <p:cNvCxnSpPr>
+            <a:stCxn id="89" idx="7"/>
+            <a:endCxn id="177" idx="3"/>
+          </p:cNvCxnSpPr>
+          <p:nvPr/>
+        </p:nvCxnSpPr>
+        <p:spPr>
+          <a:xfrm flipV="1">
+            <a:off x="5965222" y="705861"/>
+            <a:ext cx="5017246" cy="1202332"/>
+          </a:xfrm>
+          <a:prstGeom prst="straightConnector1">
+            <a:avLst/>
+          </a:prstGeom>
+          <a:ln>
+            <a:solidFill>
+              <a:schemeClr val="tx1"/>
+            </a:solidFill>
+            <a:headEnd type="none"/>
+            <a:tailEnd type="triangle"/>
+          </a:ln>
+        </p:spPr>
+        <p:style>
+          <a:lnRef idx="1">
+            <a:schemeClr val="accent1"/>
+          </a:lnRef>
+          <a:fillRef idx="0">
+            <a:schemeClr val="accent1"/>
+          </a:fillRef>
+          <a:effectRef idx="0">
+            <a:schemeClr val="accent1"/>
+          </a:effectRef>
+          <a:fontRef idx="minor">
+            <a:schemeClr val="tx1"/>
+          </a:fontRef>
+        </p:style>
+      </p:cxnSp>
+      <p:cxnSp>
+        <p:nvCxnSpPr>
+          <p:cNvPr id="216" name="Прямая со стрелкой 215"/>
+          <p:cNvCxnSpPr>
+            <a:stCxn id="89" idx="7"/>
+          </p:cNvCxnSpPr>
+          <p:nvPr/>
+        </p:nvCxnSpPr>
+        <p:spPr>
+          <a:xfrm flipV="1">
+            <a:off x="5965222" y="1095485"/>
+            <a:ext cx="6075982" cy="812708"/>
+          </a:xfrm>
+          <a:prstGeom prst="straightConnector1">
+            <a:avLst/>
+          </a:prstGeom>
+          <a:ln>
+            <a:solidFill>
+              <a:schemeClr val="tx1"/>
+            </a:solidFill>
+            <a:headEnd type="none"/>
+            <a:tailEnd type="triangle"/>
+          </a:ln>
+        </p:spPr>
+        <p:style>
+          <a:lnRef idx="1">
+            <a:schemeClr val="accent1"/>
+          </a:lnRef>
+          <a:fillRef idx="0">
+            <a:schemeClr val="accent1"/>
+          </a:fillRef>
+          <a:effectRef idx="0">
+            <a:schemeClr val="accent1"/>
+          </a:effectRef>
+          <a:fontRef idx="minor">
+            <a:schemeClr val="tx1"/>
+          </a:fontRef>
+        </p:style>
+      </p:cxnSp>
+      <p:cxnSp>
+        <p:nvCxnSpPr>
+          <p:cNvPr id="219" name="Прямая со стрелкой 218"/>
+          <p:cNvCxnSpPr>
+            <a:stCxn id="172" idx="7"/>
+          </p:cNvCxnSpPr>
+          <p:nvPr/>
+        </p:nvCxnSpPr>
+        <p:spPr>
+          <a:xfrm flipV="1">
+            <a:off x="11293993" y="1307027"/>
+            <a:ext cx="747211" cy="314324"/>
+          </a:xfrm>
+          <a:prstGeom prst="straightConnector1">
+            <a:avLst/>
+          </a:prstGeom>
+          <a:ln>
+            <a:solidFill>
+              <a:schemeClr val="tx1"/>
+            </a:solidFill>
+            <a:headEnd type="none"/>
+            <a:tailEnd type="triangle"/>
+          </a:ln>
+        </p:spPr>
+        <p:style>
+          <a:lnRef idx="1">
+            <a:schemeClr val="accent1"/>
+          </a:lnRef>
+          <a:fillRef idx="0">
+            <a:schemeClr val="accent1"/>
+          </a:fillRef>
+          <a:effectRef idx="0">
+            <a:schemeClr val="accent1"/>
+          </a:effectRef>
+          <a:fontRef idx="minor">
+            <a:schemeClr val="tx1"/>
+          </a:fontRef>
+        </p:style>
+      </p:cxnSp>
+      <p:cxnSp>
+        <p:nvCxnSpPr>
+          <p:cNvPr id="223" name="Straight Arrow Connector 47"/>
+          <p:cNvCxnSpPr>
+            <a:stCxn id="177" idx="5"/>
+          </p:cNvCxnSpPr>
+          <p:nvPr/>
+        </p:nvCxnSpPr>
+        <p:spPr>
+          <a:xfrm>
+            <a:off x="11488997" y="705861"/>
+            <a:ext cx="254848" cy="264289"/>
+          </a:xfrm>
+          <a:prstGeom prst="straightConnector1">
+            <a:avLst/>
+          </a:prstGeom>
+          <a:ln w="38100">
+            <a:tailEnd type="triangle"/>
+          </a:ln>
+        </p:spPr>
+        <p:style>
+          <a:lnRef idx="1">
+            <a:schemeClr val="accent1"/>
+          </a:lnRef>
+          <a:fillRef idx="0">
+            <a:schemeClr val="accent1"/>
+          </a:fillRef>
+          <a:effectRef idx="0">
+            <a:schemeClr val="accent1"/>
+          </a:effectRef>
+          <a:fontRef idx="minor">
+            <a:schemeClr val="tx1"/>
+          </a:fontRef>
+        </p:style>
+      </p:cxnSp>
+      <p:cxnSp>
+        <p:nvCxnSpPr>
+          <p:cNvPr id="224" name="Straight Arrow Connector 47"/>
+          <p:cNvCxnSpPr/>
+          <p:nvPr/>
+        </p:nvCxnSpPr>
+        <p:spPr>
+          <a:xfrm>
+            <a:off x="11593902" y="496595"/>
+            <a:ext cx="219683" cy="233240"/>
+          </a:xfrm>
+          <a:prstGeom prst="straightConnector1">
+            <a:avLst/>
+          </a:prstGeom>
+          <a:ln w="38100">
+            <a:tailEnd type="triangle"/>
+          </a:ln>
+        </p:spPr>
+        <p:style>
+          <a:lnRef idx="1">
+            <a:schemeClr val="accent1"/>
+          </a:lnRef>
+          <a:fillRef idx="0">
+            <a:schemeClr val="accent1"/>
+          </a:fillRef>
+          <a:effectRef idx="0">
+            <a:schemeClr val="accent1"/>
+          </a:effectRef>
+          <a:fontRef idx="minor">
+            <a:schemeClr val="tx1"/>
+          </a:fontRef>
+        </p:style>
+      </p:cxnSp>
+      <p:cxnSp>
+        <p:nvCxnSpPr>
+          <p:cNvPr id="225" name="Straight Arrow Connector 47"/>
+          <p:cNvCxnSpPr>
+            <a:stCxn id="177" idx="5"/>
+          </p:cNvCxnSpPr>
+          <p:nvPr/>
+        </p:nvCxnSpPr>
+        <p:spPr>
+          <a:xfrm>
+            <a:off x="11488997" y="705861"/>
+            <a:ext cx="324588" cy="116438"/>
+          </a:xfrm>
+          <a:prstGeom prst="straightConnector1">
+            <a:avLst/>
+          </a:prstGeom>
+          <a:ln w="38100">
+            <a:tailEnd type="triangle"/>
+          </a:ln>
+        </p:spPr>
+        <p:style>
+          <a:lnRef idx="1">
+            <a:schemeClr val="accent1"/>
+          </a:lnRef>
+          <a:fillRef idx="0">
+            <a:schemeClr val="accent1"/>
+          </a:fillRef>
+          <a:effectRef idx="0">
+            <a:schemeClr val="accent1"/>
+          </a:effectRef>
+          <a:fontRef idx="minor">
+            <a:schemeClr val="tx1"/>
+          </a:fontRef>
+        </p:style>
+      </p:cxnSp>
+      <p:cxnSp>
+        <p:nvCxnSpPr>
+          <p:cNvPr id="92" name="Прямая со стрелкой 91"/>
+          <p:cNvCxnSpPr>
+            <a:stCxn id="140" idx="6"/>
+            <a:endCxn id="112" idx="2"/>
+          </p:cNvCxnSpPr>
+          <p:nvPr/>
+        </p:nvCxnSpPr>
+        <p:spPr>
+          <a:xfrm flipV="1">
+            <a:off x="3179383" y="551947"/>
+            <a:ext cx="2298147" cy="118932"/>
+          </a:xfrm>
+          <a:prstGeom prst="straightConnector1">
+            <a:avLst/>
+          </a:prstGeom>
+          <a:ln>
+            <a:solidFill>
+              <a:schemeClr val="tx1"/>
+            </a:solidFill>
+            <a:headEnd type="none"/>
+            <a:tailEnd type="triangle"/>
+          </a:ln>
+        </p:spPr>
+        <p:style>
+          <a:lnRef idx="1">
+            <a:schemeClr val="accent1"/>
+          </a:lnRef>
+          <a:fillRef idx="0">
+            <a:schemeClr val="accent1"/>
+          </a:fillRef>
+          <a:effectRef idx="0">
+            <a:schemeClr val="accent1"/>
+          </a:effectRef>
+          <a:fontRef idx="minor">
+            <a:schemeClr val="tx1"/>
+          </a:fontRef>
+        </p:style>
+      </p:cxnSp>
+      <p:cxnSp>
+        <p:nvCxnSpPr>
+          <p:cNvPr id="98" name="Прямая со стрелкой 97"/>
+          <p:cNvCxnSpPr>
+            <a:stCxn id="177" idx="6"/>
+          </p:cNvCxnSpPr>
+          <p:nvPr/>
+        </p:nvCxnSpPr>
+        <p:spPr>
+          <a:xfrm flipV="1">
+            <a:off x="11593902" y="441243"/>
+            <a:ext cx="447302" cy="36880"/>
+          </a:xfrm>
+          <a:prstGeom prst="straightConnector1">
+            <a:avLst/>
+          </a:prstGeom>
+          <a:ln>
+            <a:solidFill>
+              <a:schemeClr val="tx1"/>
+            </a:solidFill>
+            <a:headEnd type="none"/>
+            <a:tailEnd type="triangle"/>
+          </a:ln>
+        </p:spPr>
+        <p:style>
+          <a:lnRef idx="1">
+            <a:schemeClr val="accent1"/>
+          </a:lnRef>
+          <a:fillRef idx="0">
+            <a:schemeClr val="accent1"/>
+          </a:fillRef>
+          <a:effectRef idx="0">
+            <a:schemeClr val="accent1"/>
+          </a:effectRef>
+          <a:fontRef idx="minor">
+            <a:schemeClr val="tx1"/>
+          </a:fontRef>
+        </p:style>
+      </p:cxnSp>
+      <p:sp>
+        <p:nvSpPr>
+          <p:cNvPr id="2" name="TextBox 1"/>
+          <p:cNvSpPr txBox="1"/>
+          <p:nvPr/>
+        </p:nvSpPr>
+        <p:spPr>
+          <a:xfrm>
+            <a:off x="513066" y="6461108"/>
+            <a:ext cx="5484931" cy="369332"/>
+          </a:xfrm>
+          <a:prstGeom prst="rect">
+            <a:avLst/>
+          </a:prstGeom>
+          <a:noFill/>
+        </p:spPr>
+        <p:txBody>
+          <a:bodyPr wrap="square" rtlCol="0">
+            <a:spAutoFit/>
+          </a:bodyPr>
+          <a:lstStyle/>
+          <a:p>
+            <a:r>
+              <a:rPr lang="en-US" dirty="0" smtClean="0"/>
+              <a:t>Multilevel event prediction</a:t>
+            </a:r>
+            <a:endParaRPr lang="ru-RU" dirty="0"/>
+          </a:p>
+        </p:txBody>
+      </p:sp>
+      <p:sp>
+        <p:nvSpPr>
+          <p:cNvPr id="3" name="TextBox 2"/>
+          <p:cNvSpPr txBox="1"/>
+          <p:nvPr/>
+        </p:nvSpPr>
+        <p:spPr>
+          <a:xfrm>
+            <a:off x="10454641" y="3511271"/>
+            <a:ext cx="1755265" cy="1546577"/>
+          </a:xfrm>
+          <a:prstGeom prst="rect">
+            <a:avLst/>
+          </a:prstGeom>
+          <a:noFill/>
+        </p:spPr>
+        <p:txBody>
+          <a:bodyPr wrap="square" rtlCol="0">
+            <a:spAutoFit/>
+          </a:bodyPr>
+          <a:lstStyle/>
+          <a:p>
+            <a:r>
+              <a:rPr lang="en-US" sz="1050" dirty="0" smtClean="0"/>
+              <a:t>Output – SECREW or V.</a:t>
+            </a:r>
+          </a:p>
+          <a:p>
+            <a:r>
+              <a:rPr lang="en-US" sz="1050" dirty="0" smtClean="0"/>
+              <a:t>SECREW indicates reaching new level and is used in multi-level event prediction.</a:t>
+            </a:r>
+          </a:p>
+          <a:p>
+            <a:r>
+              <a:rPr lang="en-US" sz="1050" dirty="0" smtClean="0"/>
+              <a:t>V indicates being in the highest state (only highest active V should be taken into account). It is used as input for </a:t>
+            </a:r>
+            <a:r>
+              <a:rPr lang="en-US" sz="1050" dirty="0" err="1" smtClean="0"/>
+              <a:t>dynpos</a:t>
+            </a:r>
+            <a:r>
+              <a:rPr lang="en-US" sz="1050" dirty="0" smtClean="0"/>
+              <a:t>.</a:t>
+            </a:r>
+            <a:endParaRPr lang="ru-RU" sz="1050" dirty="0"/>
+          </a:p>
+        </p:txBody>
+      </p:sp>
+      <p:sp>
+        <p:nvSpPr>
+          <p:cNvPr id="5" name="TextBox 4"/>
+          <p:cNvSpPr txBox="1"/>
+          <p:nvPr/>
+        </p:nvSpPr>
+        <p:spPr>
+          <a:xfrm>
+            <a:off x="251722" y="1343939"/>
+            <a:ext cx="1193520" cy="369332"/>
+          </a:xfrm>
+          <a:prstGeom prst="rect">
+            <a:avLst/>
+          </a:prstGeom>
+          <a:noFill/>
+        </p:spPr>
+        <p:txBody>
+          <a:bodyPr wrap="square" rtlCol="0">
+            <a:spAutoFit/>
+          </a:bodyPr>
+          <a:lstStyle/>
+          <a:p>
+            <a:r>
+              <a:rPr lang="en-US" dirty="0" smtClean="0"/>
+              <a:t>REWGATE</a:t>
+            </a:r>
+            <a:endParaRPr lang="en-US" dirty="0"/>
+          </a:p>
+        </p:txBody>
+      </p:sp>
+      <p:sp>
+        <p:nvSpPr>
+          <p:cNvPr id="6" name="TextBox 5"/>
+          <p:cNvSpPr txBox="1"/>
+          <p:nvPr/>
+        </p:nvSpPr>
+        <p:spPr>
+          <a:xfrm>
+            <a:off x="7515407" y="156052"/>
+            <a:ext cx="1782921" cy="369332"/>
+          </a:xfrm>
+          <a:prstGeom prst="rect">
+            <a:avLst/>
+          </a:prstGeom>
+          <a:noFill/>
+        </p:spPr>
+        <p:txBody>
+          <a:bodyPr wrap="square" rtlCol="0">
+            <a:spAutoFit/>
+          </a:bodyPr>
+          <a:lstStyle/>
+          <a:p>
+            <a:r>
+              <a:rPr lang="en-US" dirty="0" smtClean="0"/>
+              <a:t>SECREWINT</a:t>
+            </a:r>
+            <a:endParaRPr lang="en-US" dirty="0"/>
+          </a:p>
+        </p:txBody>
+      </p:sp>
+      <p:sp>
+        <p:nvSpPr>
+          <p:cNvPr id="99" name="Oval 32"/>
+          <p:cNvSpPr/>
+          <p:nvPr/>
+        </p:nvSpPr>
+        <p:spPr>
+          <a:xfrm>
+            <a:off x="1122356" y="3312538"/>
+            <a:ext cx="716339" cy="644141"/>
+          </a:xfrm>
+          <a:prstGeom prst="ellipse">
+            <a:avLst/>
+          </a:prstGeom>
+        </p:spPr>
+        <p:style>
+          <a:lnRef idx="2">
+            <a:schemeClr val="accent1">
+              <a:shade val="50000"/>
+            </a:schemeClr>
+          </a:lnRef>
+          <a:fillRef idx="1">
+            <a:schemeClr val="accent1"/>
+          </a:fillRef>
+          <a:effectRef idx="0">
+            <a:schemeClr val="accent1"/>
+          </a:effectRef>
+          <a:fontRef idx="minor">
+            <a:schemeClr val="lt1"/>
+          </a:fontRef>
+        </p:style>
+        <p:txBody>
+          <a:bodyPr rtlCol="0" anchor="ctr"/>
+          <a:lstStyle/>
+          <a:p>
+            <a:pPr algn="ctr"/>
+            <a:r>
+              <a:rPr lang="en-US" sz="600" dirty="0" smtClean="0"/>
+              <a:t>REWGATE</a:t>
+            </a:r>
+            <a:endParaRPr lang="ru-RU" sz="600" dirty="0"/>
+          </a:p>
+        </p:txBody>
+      </p:sp>
+      <p:sp>
+        <p:nvSpPr>
+          <p:cNvPr id="102" name="Oval 32"/>
+          <p:cNvSpPr/>
+          <p:nvPr/>
+        </p:nvSpPr>
+        <p:spPr>
+          <a:xfrm>
+            <a:off x="4531307" y="2876803"/>
+            <a:ext cx="708587" cy="644141"/>
+          </a:xfrm>
+          <a:prstGeom prst="ellipse">
+            <a:avLst/>
+          </a:prstGeom>
+        </p:spPr>
+        <p:style>
+          <a:lnRef idx="2">
+            <a:schemeClr val="accent1">
+              <a:shade val="50000"/>
+            </a:schemeClr>
+          </a:lnRef>
+          <a:fillRef idx="1">
+            <a:schemeClr val="accent1"/>
+          </a:fillRef>
+          <a:effectRef idx="0">
+            <a:schemeClr val="accent1"/>
+          </a:effectRef>
+          <a:fontRef idx="minor">
+            <a:schemeClr val="lt1"/>
+          </a:fontRef>
+        </p:style>
+        <p:txBody>
+          <a:bodyPr rtlCol="0" anchor="ctr"/>
+          <a:lstStyle/>
+          <a:p>
+            <a:pPr algn="ctr"/>
+            <a:r>
+              <a:rPr lang="en-US" sz="600" dirty="0" smtClean="0"/>
+              <a:t>REWGATE</a:t>
+            </a:r>
+            <a:endParaRPr lang="ru-RU" sz="600" dirty="0"/>
+          </a:p>
+        </p:txBody>
+      </p:sp>
+      <p:sp>
+        <p:nvSpPr>
+          <p:cNvPr id="104" name="Oval 32"/>
+          <p:cNvSpPr/>
+          <p:nvPr/>
+        </p:nvSpPr>
+        <p:spPr>
+          <a:xfrm>
+            <a:off x="2752260" y="3371260"/>
+            <a:ext cx="716339" cy="644141"/>
+          </a:xfrm>
+          <a:prstGeom prst="ellipse">
+            <a:avLst/>
+          </a:prstGeom>
+        </p:spPr>
+        <p:style>
+          <a:lnRef idx="2">
+            <a:schemeClr val="accent1">
+              <a:shade val="50000"/>
+            </a:schemeClr>
+          </a:lnRef>
+          <a:fillRef idx="1">
+            <a:schemeClr val="accent1"/>
+          </a:fillRef>
+          <a:effectRef idx="0">
+            <a:schemeClr val="accent1"/>
+          </a:effectRef>
+          <a:fontRef idx="minor">
+            <a:schemeClr val="lt1"/>
+          </a:fontRef>
+        </p:style>
+        <p:txBody>
+          <a:bodyPr rtlCol="0" anchor="ctr"/>
+          <a:lstStyle/>
+          <a:p>
+            <a:pPr algn="ctr"/>
+            <a:r>
+              <a:rPr lang="en-US" sz="600" dirty="0" smtClean="0"/>
+              <a:t>REWGATE</a:t>
+            </a:r>
+            <a:endParaRPr lang="ru-RU" sz="600" dirty="0"/>
+          </a:p>
+        </p:txBody>
+      </p:sp>
+      <p:sp>
+        <p:nvSpPr>
+          <p:cNvPr id="16" name="TextBox 15"/>
+          <p:cNvSpPr txBox="1"/>
+          <p:nvPr/>
+        </p:nvSpPr>
+        <p:spPr>
+          <a:xfrm>
+            <a:off x="2027328" y="4893276"/>
+            <a:ext cx="2166205" cy="253916"/>
+          </a:xfrm>
+          <a:prstGeom prst="rect">
+            <a:avLst/>
+          </a:prstGeom>
+          <a:noFill/>
+        </p:spPr>
+        <p:txBody>
+          <a:bodyPr wrap="square" rtlCol="0">
+            <a:spAutoFit/>
+          </a:bodyPr>
+          <a:lstStyle/>
+          <a:p>
+            <a:r>
+              <a:rPr lang="en-US" sz="1050" dirty="0" err="1" smtClean="0"/>
+              <a:t>Chartime</a:t>
+            </a:r>
+            <a:r>
+              <a:rPr lang="en-US" sz="1050" dirty="0" smtClean="0"/>
+              <a:t> ~ 0.5 prognosis period (L)</a:t>
+            </a:r>
+            <a:endParaRPr lang="en-US" sz="1050" dirty="0"/>
+          </a:p>
+        </p:txBody>
+      </p:sp>
+      <p:cxnSp>
+        <p:nvCxnSpPr>
+          <p:cNvPr id="109" name="Прямая со стрелкой 108"/>
+          <p:cNvCxnSpPr>
+            <a:stCxn id="81" idx="5"/>
+            <a:endCxn id="99" idx="1"/>
+          </p:cNvCxnSpPr>
+          <p:nvPr/>
+        </p:nvCxnSpPr>
+        <p:spPr>
+          <a:xfrm>
+            <a:off x="863156" y="3284631"/>
+            <a:ext cx="364105" cy="122239"/>
+          </a:xfrm>
+          <a:prstGeom prst="straightConnector1">
+            <a:avLst/>
+          </a:prstGeom>
+          <a:ln>
+            <a:solidFill>
+              <a:srgbClr val="00B050"/>
+            </a:solidFill>
+            <a:tailEnd type="triangle"/>
+          </a:ln>
+        </p:spPr>
+        <p:style>
+          <a:lnRef idx="1">
+            <a:schemeClr val="accent1"/>
+          </a:lnRef>
+          <a:fillRef idx="0">
+            <a:schemeClr val="accent1"/>
+          </a:fillRef>
+          <a:effectRef idx="0">
+            <a:schemeClr val="accent1"/>
+          </a:effectRef>
+          <a:fontRef idx="minor">
+            <a:schemeClr val="tx1"/>
+          </a:fontRef>
+        </p:style>
+      </p:cxnSp>
+      <p:cxnSp>
+        <p:nvCxnSpPr>
+          <p:cNvPr id="110" name="Прямая со стрелкой 109"/>
+          <p:cNvCxnSpPr>
+            <a:stCxn id="83" idx="6"/>
+            <a:endCxn id="102" idx="2"/>
+          </p:cNvCxnSpPr>
+          <p:nvPr/>
+        </p:nvCxnSpPr>
+        <p:spPr>
+          <a:xfrm>
+            <a:off x="4248683" y="3014097"/>
+            <a:ext cx="282624" cy="184777"/>
+          </a:xfrm>
+          <a:prstGeom prst="straightConnector1">
+            <a:avLst/>
+          </a:prstGeom>
+          <a:ln>
+            <a:solidFill>
+              <a:srgbClr val="00B050"/>
+            </a:solidFill>
+            <a:tailEnd type="triangle"/>
+          </a:ln>
+        </p:spPr>
+        <p:style>
+          <a:lnRef idx="1">
+            <a:schemeClr val="accent1"/>
+          </a:lnRef>
+          <a:fillRef idx="0">
+            <a:schemeClr val="accent1"/>
+          </a:fillRef>
+          <a:effectRef idx="0">
+            <a:schemeClr val="accent1"/>
+          </a:effectRef>
+          <a:fontRef idx="minor">
+            <a:schemeClr val="tx1"/>
+          </a:fontRef>
+        </p:style>
+      </p:cxnSp>
+      <p:cxnSp>
+        <p:nvCxnSpPr>
+          <p:cNvPr id="111" name="Прямая со стрелкой 110"/>
+          <p:cNvCxnSpPr>
+            <a:stCxn id="82" idx="5"/>
+            <a:endCxn id="104" idx="1"/>
+          </p:cNvCxnSpPr>
+          <p:nvPr/>
+        </p:nvCxnSpPr>
+        <p:spPr>
+          <a:xfrm>
+            <a:off x="2533857" y="3297188"/>
+            <a:ext cx="323308" cy="168404"/>
+          </a:xfrm>
+          <a:prstGeom prst="straightConnector1">
+            <a:avLst/>
+          </a:prstGeom>
+          <a:ln>
+            <a:solidFill>
+              <a:srgbClr val="00B050"/>
+            </a:solidFill>
+            <a:tailEnd type="triangle"/>
+          </a:ln>
+        </p:spPr>
+        <p:style>
+          <a:lnRef idx="1">
+            <a:schemeClr val="accent1"/>
+          </a:lnRef>
+          <a:fillRef idx="0">
+            <a:schemeClr val="accent1"/>
+          </a:fillRef>
+          <a:effectRef idx="0">
+            <a:schemeClr val="accent1"/>
+          </a:effectRef>
+          <a:fontRef idx="minor">
+            <a:schemeClr val="tx1"/>
+          </a:fontRef>
+        </p:style>
+      </p:cxnSp>
+      <p:sp>
+        <p:nvSpPr>
+          <p:cNvPr id="120" name="TextBox 119"/>
+          <p:cNvSpPr txBox="1"/>
+          <p:nvPr/>
+        </p:nvSpPr>
+        <p:spPr>
+          <a:xfrm>
+            <a:off x="4248683" y="3088167"/>
+            <a:ext cx="272444" cy="253916"/>
+          </a:xfrm>
+          <a:prstGeom prst="rect">
+            <a:avLst/>
+          </a:prstGeom>
+          <a:noFill/>
+        </p:spPr>
+        <p:txBody>
+          <a:bodyPr wrap="square" rtlCol="0">
+            <a:spAutoFit/>
+          </a:bodyPr>
+          <a:lstStyle/>
+          <a:p>
+            <a:r>
+              <a:rPr lang="en-US" sz="1050" dirty="0" smtClean="0"/>
+              <a:t>L</a:t>
+            </a:r>
+            <a:endParaRPr lang="en-US" sz="1050" dirty="0"/>
+          </a:p>
+        </p:txBody>
+      </p:sp>
+      <p:sp>
+        <p:nvSpPr>
+          <p:cNvPr id="121" name="TextBox 120"/>
+          <p:cNvSpPr txBox="1"/>
+          <p:nvPr/>
+        </p:nvSpPr>
+        <p:spPr>
+          <a:xfrm>
+            <a:off x="3110430" y="2815533"/>
+            <a:ext cx="272444" cy="253916"/>
+          </a:xfrm>
+          <a:prstGeom prst="rect">
+            <a:avLst/>
+          </a:prstGeom>
+          <a:noFill/>
+        </p:spPr>
+        <p:txBody>
+          <a:bodyPr wrap="square" rtlCol="0">
+            <a:spAutoFit/>
+          </a:bodyPr>
+          <a:lstStyle/>
+          <a:p>
+            <a:r>
+              <a:rPr lang="en-US" sz="1050" dirty="0" smtClean="0"/>
+              <a:t>L</a:t>
+            </a:r>
+            <a:endParaRPr lang="en-US" sz="1050" dirty="0"/>
+          </a:p>
+        </p:txBody>
+      </p:sp>
+      <p:cxnSp>
+        <p:nvCxnSpPr>
+          <p:cNvPr id="123" name="Прямая со стрелкой 122"/>
+          <p:cNvCxnSpPr>
+            <a:stCxn id="140" idx="3"/>
+            <a:endCxn id="77" idx="0"/>
+          </p:cNvCxnSpPr>
+          <p:nvPr/>
+        </p:nvCxnSpPr>
+        <p:spPr>
+          <a:xfrm flipH="1">
+            <a:off x="676371" y="898617"/>
+            <a:ext cx="1891578" cy="3172136"/>
+          </a:xfrm>
+          <a:prstGeom prst="straightConnector1">
+            <a:avLst/>
+          </a:prstGeom>
+          <a:ln w="15875">
+            <a:tailEnd type="arrow"/>
+          </a:ln>
+        </p:spPr>
+        <p:style>
+          <a:lnRef idx="1">
+            <a:schemeClr val="accent1"/>
+          </a:lnRef>
+          <a:fillRef idx="0">
+            <a:schemeClr val="accent1"/>
+          </a:fillRef>
+          <a:effectRef idx="0">
+            <a:schemeClr val="accent1"/>
+          </a:effectRef>
+          <a:fontRef idx="minor">
+            <a:schemeClr val="tx1"/>
+          </a:fontRef>
+        </p:style>
+      </p:cxnSp>
+      <p:cxnSp>
+        <p:nvCxnSpPr>
+          <p:cNvPr id="124" name="Прямая со стрелкой 123"/>
+          <p:cNvCxnSpPr>
+            <a:stCxn id="140" idx="3"/>
+            <a:endCxn id="79" idx="1"/>
+          </p:cNvCxnSpPr>
+          <p:nvPr/>
+        </p:nvCxnSpPr>
+        <p:spPr>
+          <a:xfrm flipH="1">
+            <a:off x="1822378" y="898617"/>
+            <a:ext cx="745571" cy="3336848"/>
+          </a:xfrm>
+          <a:prstGeom prst="straightConnector1">
+            <a:avLst/>
+          </a:prstGeom>
+          <a:ln w="15875">
+            <a:tailEnd type="arrow"/>
+          </a:ln>
+        </p:spPr>
+        <p:style>
+          <a:lnRef idx="1">
+            <a:schemeClr val="accent1"/>
+          </a:lnRef>
+          <a:fillRef idx="0">
+            <a:schemeClr val="accent1"/>
+          </a:fillRef>
+          <a:effectRef idx="0">
+            <a:schemeClr val="accent1"/>
+          </a:effectRef>
+          <a:fontRef idx="minor">
+            <a:schemeClr val="tx1"/>
+          </a:fontRef>
+        </p:style>
+      </p:cxnSp>
+      <p:cxnSp>
+        <p:nvCxnSpPr>
+          <p:cNvPr id="125" name="Прямая со стрелкой 124"/>
+          <p:cNvCxnSpPr>
+            <a:stCxn id="140" idx="5"/>
+            <a:endCxn id="80" idx="1"/>
+          </p:cNvCxnSpPr>
+          <p:nvPr/>
+        </p:nvCxnSpPr>
+        <p:spPr>
+          <a:xfrm>
+            <a:off x="3074478" y="898617"/>
+            <a:ext cx="593346" cy="3231571"/>
+          </a:xfrm>
+          <a:prstGeom prst="straightConnector1">
+            <a:avLst/>
+          </a:prstGeom>
+          <a:ln w="15875">
+            <a:tailEnd type="arrow"/>
+          </a:ln>
+        </p:spPr>
+        <p:style>
+          <a:lnRef idx="1">
+            <a:schemeClr val="accent1"/>
+          </a:lnRef>
+          <a:fillRef idx="0">
+            <a:schemeClr val="accent1"/>
+          </a:fillRef>
+          <a:effectRef idx="0">
+            <a:schemeClr val="accent1"/>
+          </a:effectRef>
+          <a:fontRef idx="minor">
+            <a:schemeClr val="tx1"/>
+          </a:fontRef>
+        </p:style>
+      </p:cxnSp>
+      <p:cxnSp>
+        <p:nvCxnSpPr>
+          <p:cNvPr id="156" name="Straight Arrow Connector 47"/>
+          <p:cNvCxnSpPr>
+            <a:stCxn id="140" idx="6"/>
+            <a:endCxn id="102" idx="0"/>
+          </p:cNvCxnSpPr>
+          <p:nvPr/>
+        </p:nvCxnSpPr>
+        <p:spPr>
+          <a:xfrm>
+            <a:off x="3179383" y="670879"/>
+            <a:ext cx="1706218" cy="2205924"/>
+          </a:xfrm>
+          <a:prstGeom prst="straightConnector1">
+            <a:avLst/>
+          </a:prstGeom>
+          <a:ln w="38100">
+            <a:tailEnd type="triangle"/>
+          </a:ln>
+        </p:spPr>
+        <p:style>
+          <a:lnRef idx="1">
+            <a:schemeClr val="accent1"/>
+          </a:lnRef>
+          <a:fillRef idx="0">
+            <a:schemeClr val="accent1"/>
+          </a:fillRef>
+          <a:effectRef idx="0">
+            <a:schemeClr val="accent1"/>
+          </a:effectRef>
+          <a:fontRef idx="minor">
+            <a:schemeClr val="tx1"/>
+          </a:fontRef>
+        </p:style>
+      </p:cxnSp>
+      <p:sp>
+        <p:nvSpPr>
+          <p:cNvPr id="183" name="TextBox 182"/>
+          <p:cNvSpPr txBox="1"/>
+          <p:nvPr/>
+        </p:nvSpPr>
+        <p:spPr>
+          <a:xfrm>
+            <a:off x="861090" y="2179104"/>
+            <a:ext cx="272444" cy="253916"/>
+          </a:xfrm>
+          <a:prstGeom prst="rect">
+            <a:avLst/>
+          </a:prstGeom>
+          <a:noFill/>
+        </p:spPr>
+        <p:txBody>
+          <a:bodyPr wrap="square" rtlCol="0">
+            <a:spAutoFit/>
+          </a:bodyPr>
+          <a:lstStyle/>
+          <a:p>
+            <a:r>
+              <a:rPr lang="en-US" sz="1050" dirty="0" smtClean="0"/>
+              <a:t>L</a:t>
+            </a:r>
+            <a:endParaRPr lang="en-US" sz="1050" dirty="0"/>
+          </a:p>
+        </p:txBody>
+      </p:sp>
+      <p:cxnSp>
+        <p:nvCxnSpPr>
+          <p:cNvPr id="184" name="Straight Arrow Connector 47"/>
+          <p:cNvCxnSpPr>
+            <a:stCxn id="133" idx="2"/>
+            <a:endCxn id="104" idx="0"/>
+          </p:cNvCxnSpPr>
+          <p:nvPr/>
+        </p:nvCxnSpPr>
+        <p:spPr>
+          <a:xfrm>
+            <a:off x="1273848" y="506125"/>
+            <a:ext cx="1836582" cy="2865135"/>
+          </a:xfrm>
+          <a:prstGeom prst="straightConnector1">
+            <a:avLst/>
+          </a:prstGeom>
+          <a:ln w="38100">
+            <a:tailEnd type="triangle"/>
+          </a:ln>
+        </p:spPr>
+        <p:style>
+          <a:lnRef idx="1">
+            <a:schemeClr val="accent1"/>
+          </a:lnRef>
+          <a:fillRef idx="0">
+            <a:schemeClr val="accent1"/>
+          </a:fillRef>
+          <a:effectRef idx="0">
+            <a:schemeClr val="accent1"/>
+          </a:effectRef>
+          <a:fontRef idx="minor">
+            <a:schemeClr val="tx1"/>
+          </a:fontRef>
+        </p:style>
+      </p:cxnSp>
+      <p:cxnSp>
+        <p:nvCxnSpPr>
+          <p:cNvPr id="185" name="Straight Arrow Connector 47"/>
+          <p:cNvCxnSpPr>
+            <a:stCxn id="133" idx="2"/>
+            <a:endCxn id="99" idx="0"/>
+          </p:cNvCxnSpPr>
+          <p:nvPr/>
+        </p:nvCxnSpPr>
+        <p:spPr>
+          <a:xfrm>
+            <a:off x="1273848" y="506125"/>
+            <a:ext cx="206678" cy="2806413"/>
+          </a:xfrm>
+          <a:prstGeom prst="straightConnector1">
+            <a:avLst/>
+          </a:prstGeom>
+          <a:ln w="38100">
+            <a:tailEnd type="triangle"/>
+          </a:ln>
+        </p:spPr>
+        <p:style>
+          <a:lnRef idx="1">
+            <a:schemeClr val="accent1"/>
+          </a:lnRef>
+          <a:fillRef idx="0">
+            <a:schemeClr val="accent1"/>
+          </a:fillRef>
+          <a:effectRef idx="0">
+            <a:schemeClr val="accent1"/>
+          </a:effectRef>
+          <a:fontRef idx="minor">
+            <a:schemeClr val="tx1"/>
+          </a:fontRef>
+        </p:style>
+      </p:cxnSp>
+      <p:cxnSp>
+        <p:nvCxnSpPr>
+          <p:cNvPr id="186" name="Straight Arrow Connector 47"/>
+          <p:cNvCxnSpPr>
+            <a:stCxn id="133" idx="2"/>
+            <a:endCxn id="102" idx="1"/>
+          </p:cNvCxnSpPr>
+          <p:nvPr/>
+        </p:nvCxnSpPr>
+        <p:spPr>
+          <a:xfrm>
+            <a:off x="1273848" y="506125"/>
+            <a:ext cx="3361229" cy="2465010"/>
+          </a:xfrm>
+          <a:prstGeom prst="straightConnector1">
+            <a:avLst/>
+          </a:prstGeom>
+          <a:ln w="38100">
+            <a:tailEnd type="triangle"/>
+          </a:ln>
+        </p:spPr>
+        <p:style>
+          <a:lnRef idx="1">
+            <a:schemeClr val="accent1"/>
+          </a:lnRef>
+          <a:fillRef idx="0">
+            <a:schemeClr val="accent1"/>
+          </a:fillRef>
+          <a:effectRef idx="0">
+            <a:schemeClr val="accent1"/>
+          </a:effectRef>
+          <a:fontRef idx="minor">
+            <a:schemeClr val="tx1"/>
+          </a:fontRef>
+        </p:style>
+      </p:cxnSp>
+      <p:sp>
+        <p:nvSpPr>
+          <p:cNvPr id="210" name="Oval 32"/>
+          <p:cNvSpPr/>
+          <p:nvPr/>
+        </p:nvSpPr>
+        <p:spPr>
+          <a:xfrm>
+            <a:off x="5778436" y="4112446"/>
+            <a:ext cx="716339" cy="644141"/>
+          </a:xfrm>
+          <a:prstGeom prst="ellipse">
+            <a:avLst/>
+          </a:prstGeom>
+        </p:spPr>
+        <p:style>
+          <a:lnRef idx="2">
+            <a:schemeClr val="accent1">
+              <a:shade val="50000"/>
+            </a:schemeClr>
+          </a:lnRef>
+          <a:fillRef idx="1">
+            <a:schemeClr val="accent1"/>
+          </a:fillRef>
+          <a:effectRef idx="0">
+            <a:schemeClr val="accent1"/>
+          </a:effectRef>
+          <a:fontRef idx="minor">
+            <a:schemeClr val="lt1"/>
+          </a:fontRef>
+        </p:style>
+        <p:txBody>
+          <a:bodyPr rtlCol="0" anchor="ctr"/>
+          <a:lstStyle/>
+          <a:p>
+            <a:pPr algn="ctr"/>
+            <a:r>
+              <a:rPr lang="en-US" sz="3600" dirty="0"/>
+              <a:t>L</a:t>
+            </a:r>
+            <a:endParaRPr lang="ru-RU" sz="3600" dirty="0"/>
+          </a:p>
+        </p:txBody>
+      </p:sp>
+      <p:sp>
+        <p:nvSpPr>
+          <p:cNvPr id="211" name="Oval 32"/>
+          <p:cNvSpPr/>
+          <p:nvPr/>
+        </p:nvSpPr>
+        <p:spPr>
+          <a:xfrm>
+            <a:off x="7177708" y="4182826"/>
+            <a:ext cx="716339" cy="644141"/>
+          </a:xfrm>
+          <a:prstGeom prst="ellipse">
+            <a:avLst/>
+          </a:prstGeom>
+        </p:spPr>
+        <p:style>
+          <a:lnRef idx="2">
+            <a:schemeClr val="accent1">
+              <a:shade val="50000"/>
+            </a:schemeClr>
+          </a:lnRef>
+          <a:fillRef idx="1">
+            <a:schemeClr val="accent1"/>
+          </a:fillRef>
+          <a:effectRef idx="0">
+            <a:schemeClr val="accent1"/>
+          </a:effectRef>
+          <a:fontRef idx="minor">
+            <a:schemeClr val="lt1"/>
+          </a:fontRef>
+        </p:style>
+        <p:txBody>
+          <a:bodyPr rtlCol="0" anchor="ctr"/>
+          <a:lstStyle/>
+          <a:p>
+            <a:pPr algn="ctr"/>
+            <a:r>
+              <a:rPr lang="en-US" sz="3600" dirty="0"/>
+              <a:t>L</a:t>
+            </a:r>
+            <a:endParaRPr lang="ru-RU" sz="3600" dirty="0"/>
+          </a:p>
+        </p:txBody>
+      </p:sp>
+      <p:sp>
+        <p:nvSpPr>
+          <p:cNvPr id="212" name="Oval 32"/>
+          <p:cNvSpPr/>
+          <p:nvPr/>
+        </p:nvSpPr>
+        <p:spPr>
+          <a:xfrm>
+            <a:off x="9023154" y="4077549"/>
+            <a:ext cx="716339" cy="644141"/>
+          </a:xfrm>
+          <a:prstGeom prst="ellipse">
+            <a:avLst/>
+          </a:prstGeom>
+        </p:spPr>
+        <p:style>
+          <a:lnRef idx="2">
+            <a:schemeClr val="accent1">
+              <a:shade val="50000"/>
+            </a:schemeClr>
+          </a:lnRef>
+          <a:fillRef idx="1">
+            <a:schemeClr val="accent1"/>
+          </a:fillRef>
+          <a:effectRef idx="0">
+            <a:schemeClr val="accent1"/>
+          </a:effectRef>
+          <a:fontRef idx="minor">
+            <a:schemeClr val="lt1"/>
+          </a:fontRef>
+        </p:style>
+        <p:txBody>
+          <a:bodyPr rtlCol="0" anchor="ctr"/>
+          <a:lstStyle/>
+          <a:p>
+            <a:pPr algn="ctr"/>
+            <a:r>
+              <a:rPr lang="en-US" sz="3600" dirty="0"/>
+              <a:t>L</a:t>
+            </a:r>
+            <a:endParaRPr lang="ru-RU" sz="3600" dirty="0"/>
+          </a:p>
+        </p:txBody>
+      </p:sp>
+      <p:sp>
+        <p:nvSpPr>
+          <p:cNvPr id="213" name="Oval 32"/>
+          <p:cNvSpPr/>
+          <p:nvPr/>
+        </p:nvSpPr>
+        <p:spPr>
+          <a:xfrm>
+            <a:off x="5711957" y="2776515"/>
+            <a:ext cx="716339" cy="644141"/>
+          </a:xfrm>
+          <a:prstGeom prst="ellipse">
+            <a:avLst/>
+          </a:prstGeom>
+        </p:spPr>
+        <p:style>
+          <a:lnRef idx="2">
+            <a:schemeClr val="accent1">
+              <a:shade val="50000"/>
+            </a:schemeClr>
+          </a:lnRef>
+          <a:fillRef idx="1">
+            <a:schemeClr val="accent1"/>
+          </a:fillRef>
+          <a:effectRef idx="0">
+            <a:schemeClr val="accent1"/>
+          </a:effectRef>
+          <a:fontRef idx="minor">
+            <a:schemeClr val="lt1"/>
+          </a:fontRef>
+        </p:style>
+        <p:txBody>
+          <a:bodyPr rtlCol="0" anchor="ctr"/>
+          <a:lstStyle/>
+          <a:p>
+            <a:pPr algn="ctr"/>
+            <a:r>
+              <a:rPr lang="en-US" sz="1200" dirty="0" smtClean="0"/>
+              <a:t>WTA</a:t>
+            </a:r>
+            <a:endParaRPr lang="ru-RU" sz="1200" dirty="0"/>
+          </a:p>
+        </p:txBody>
+      </p:sp>
+      <p:sp>
+        <p:nvSpPr>
+          <p:cNvPr id="214" name="Oval 32"/>
+          <p:cNvSpPr/>
+          <p:nvPr/>
+        </p:nvSpPr>
+        <p:spPr>
+          <a:xfrm>
+            <a:off x="7382658" y="2789072"/>
+            <a:ext cx="716339" cy="644141"/>
+          </a:xfrm>
+          <a:prstGeom prst="ellipse">
+            <a:avLst/>
+          </a:prstGeom>
+        </p:spPr>
+        <p:style>
+          <a:lnRef idx="2">
+            <a:schemeClr val="accent1">
+              <a:shade val="50000"/>
+            </a:schemeClr>
+          </a:lnRef>
+          <a:fillRef idx="1">
+            <a:schemeClr val="accent1"/>
+          </a:fillRef>
+          <a:effectRef idx="0">
+            <a:schemeClr val="accent1"/>
+          </a:effectRef>
+          <a:fontRef idx="minor">
+            <a:schemeClr val="lt1"/>
+          </a:fontRef>
+        </p:style>
+        <p:txBody>
+          <a:bodyPr rtlCol="0" anchor="ctr"/>
+          <a:lstStyle/>
+          <a:p>
+            <a:pPr algn="ctr"/>
+            <a:r>
+              <a:rPr lang="en-US" sz="1200" dirty="0" smtClean="0"/>
+              <a:t>WTA</a:t>
+            </a:r>
+            <a:endParaRPr lang="ru-RU" sz="1200" dirty="0"/>
+          </a:p>
+        </p:txBody>
+      </p:sp>
+      <p:sp>
+        <p:nvSpPr>
+          <p:cNvPr id="215" name="Oval 32"/>
+          <p:cNvSpPr/>
+          <p:nvPr/>
+        </p:nvSpPr>
+        <p:spPr>
+          <a:xfrm>
+            <a:off x="8992579" y="2733719"/>
+            <a:ext cx="716339" cy="644141"/>
+          </a:xfrm>
+          <a:prstGeom prst="ellipse">
+            <a:avLst/>
+          </a:prstGeom>
+        </p:spPr>
+        <p:style>
+          <a:lnRef idx="2">
+            <a:schemeClr val="accent1">
+              <a:shade val="50000"/>
+            </a:schemeClr>
+          </a:lnRef>
+          <a:fillRef idx="1">
+            <a:schemeClr val="accent1"/>
+          </a:fillRef>
+          <a:effectRef idx="0">
+            <a:schemeClr val="accent1"/>
+          </a:effectRef>
+          <a:fontRef idx="minor">
+            <a:schemeClr val="lt1"/>
+          </a:fontRef>
+        </p:style>
+        <p:txBody>
+          <a:bodyPr rtlCol="0" anchor="ctr"/>
+          <a:lstStyle/>
+          <a:p>
+            <a:pPr algn="ctr"/>
+            <a:r>
+              <a:rPr lang="en-US" sz="1200" dirty="0" smtClean="0"/>
+              <a:t>WTA</a:t>
+            </a:r>
+            <a:endParaRPr lang="ru-RU" sz="1200" dirty="0"/>
+          </a:p>
+        </p:txBody>
+      </p:sp>
+      <p:cxnSp>
+        <p:nvCxnSpPr>
+          <p:cNvPr id="217" name="Прямая со стрелкой 216"/>
+          <p:cNvCxnSpPr>
+            <a:stCxn id="214" idx="6"/>
+            <a:endCxn id="215" idx="2"/>
+          </p:cNvCxnSpPr>
+          <p:nvPr/>
+        </p:nvCxnSpPr>
+        <p:spPr>
+          <a:xfrm flipV="1">
+            <a:off x="8098997" y="3055790"/>
+            <a:ext cx="893582" cy="55353"/>
+          </a:xfrm>
+          <a:prstGeom prst="straightConnector1">
+            <a:avLst/>
+          </a:prstGeom>
+          <a:ln>
+            <a:solidFill>
+              <a:schemeClr val="tx1"/>
+            </a:solidFill>
+            <a:headEnd type="triangle"/>
+            <a:tailEnd type="triangle"/>
+          </a:ln>
+        </p:spPr>
+        <p:style>
+          <a:lnRef idx="1">
+            <a:schemeClr val="accent1"/>
+          </a:lnRef>
+          <a:fillRef idx="0">
+            <a:schemeClr val="accent1"/>
+          </a:fillRef>
+          <a:effectRef idx="0">
+            <a:schemeClr val="accent1"/>
+          </a:effectRef>
+          <a:fontRef idx="minor">
+            <a:schemeClr val="tx1"/>
+          </a:fontRef>
+        </p:style>
+      </p:cxnSp>
+      <p:cxnSp>
+        <p:nvCxnSpPr>
+          <p:cNvPr id="218" name="Прямая со стрелкой 217"/>
+          <p:cNvCxnSpPr>
+            <a:stCxn id="214" idx="2"/>
+            <a:endCxn id="213" idx="6"/>
+          </p:cNvCxnSpPr>
+          <p:nvPr/>
+        </p:nvCxnSpPr>
+        <p:spPr>
+          <a:xfrm flipH="1" flipV="1">
+            <a:off x="6428296" y="3098586"/>
+            <a:ext cx="954362" cy="12557"/>
+          </a:xfrm>
+          <a:prstGeom prst="straightConnector1">
+            <a:avLst/>
+          </a:prstGeom>
+          <a:ln>
+            <a:solidFill>
+              <a:schemeClr val="tx1"/>
+            </a:solidFill>
+            <a:headEnd type="triangle"/>
+            <a:tailEnd type="triangle"/>
+          </a:ln>
+        </p:spPr>
+        <p:style>
+          <a:lnRef idx="1">
+            <a:schemeClr val="accent1"/>
+          </a:lnRef>
+          <a:fillRef idx="0">
+            <a:schemeClr val="accent1"/>
+          </a:fillRef>
+          <a:effectRef idx="0">
+            <a:schemeClr val="accent1"/>
+          </a:effectRef>
+          <a:fontRef idx="minor">
+            <a:schemeClr val="tx1"/>
+          </a:fontRef>
+        </p:style>
+      </p:cxnSp>
+      <p:cxnSp>
+        <p:nvCxnSpPr>
+          <p:cNvPr id="220" name="Straight Arrow Connector 47"/>
+          <p:cNvCxnSpPr/>
+          <p:nvPr/>
+        </p:nvCxnSpPr>
+        <p:spPr>
+          <a:xfrm flipH="1" flipV="1">
+            <a:off x="6070127" y="3439128"/>
+            <a:ext cx="66479" cy="691790"/>
+          </a:xfrm>
+          <a:prstGeom prst="straightConnector1">
+            <a:avLst/>
+          </a:prstGeom>
+          <a:ln w="38100">
+            <a:tailEnd type="triangle"/>
+          </a:ln>
+        </p:spPr>
+        <p:style>
+          <a:lnRef idx="1">
+            <a:schemeClr val="accent1"/>
+          </a:lnRef>
+          <a:fillRef idx="0">
+            <a:schemeClr val="accent1"/>
+          </a:fillRef>
+          <a:effectRef idx="0">
+            <a:schemeClr val="accent1"/>
+          </a:effectRef>
+          <a:fontRef idx="minor">
+            <a:schemeClr val="tx1"/>
+          </a:fontRef>
+        </p:style>
+      </p:cxnSp>
+      <p:cxnSp>
+        <p:nvCxnSpPr>
+          <p:cNvPr id="221" name="Straight Arrow Connector 31"/>
+          <p:cNvCxnSpPr>
+            <a:stCxn id="259" idx="3"/>
+            <a:endCxn id="210" idx="7"/>
+          </p:cNvCxnSpPr>
+          <p:nvPr/>
+        </p:nvCxnSpPr>
+        <p:spPr>
+          <a:xfrm flipH="1">
+            <a:off x="6389870" y="3904040"/>
+            <a:ext cx="297626" cy="302738"/>
+          </a:xfrm>
+          <a:prstGeom prst="straightConnector1">
+            <a:avLst/>
+          </a:prstGeom>
+          <a:ln w="38100">
+            <a:solidFill>
+              <a:schemeClr val="accent1"/>
+            </a:solidFill>
+            <a:prstDash val="dash"/>
+            <a:tailEnd type="triangle"/>
+          </a:ln>
+        </p:spPr>
+        <p:style>
+          <a:lnRef idx="1">
+            <a:schemeClr val="accent1"/>
+          </a:lnRef>
+          <a:fillRef idx="0">
+            <a:schemeClr val="accent1"/>
+          </a:fillRef>
+          <a:effectRef idx="0">
+            <a:schemeClr val="accent1"/>
+          </a:effectRef>
+          <a:fontRef idx="minor">
+            <a:schemeClr val="tx1"/>
+          </a:fontRef>
+        </p:style>
+      </p:cxnSp>
+      <p:cxnSp>
+        <p:nvCxnSpPr>
+          <p:cNvPr id="222" name="Straight Arrow Connector 31"/>
+          <p:cNvCxnSpPr>
+            <a:stCxn id="261" idx="3"/>
+            <a:endCxn id="211" idx="7"/>
+          </p:cNvCxnSpPr>
+          <p:nvPr/>
+        </p:nvCxnSpPr>
+        <p:spPr>
+          <a:xfrm flipH="1">
+            <a:off x="7789142" y="3962762"/>
+            <a:ext cx="528258" cy="314396"/>
+          </a:xfrm>
+          <a:prstGeom prst="straightConnector1">
+            <a:avLst/>
+          </a:prstGeom>
+          <a:ln w="38100">
+            <a:solidFill>
+              <a:schemeClr val="accent1"/>
+            </a:solidFill>
+            <a:prstDash val="dash"/>
+            <a:tailEnd type="triangle"/>
+          </a:ln>
+        </p:spPr>
+        <p:style>
+          <a:lnRef idx="1">
+            <a:schemeClr val="accent1"/>
+          </a:lnRef>
+          <a:fillRef idx="0">
+            <a:schemeClr val="accent1"/>
+          </a:fillRef>
+          <a:effectRef idx="0">
+            <a:schemeClr val="accent1"/>
+          </a:effectRef>
+          <a:fontRef idx="minor">
+            <a:schemeClr val="tx1"/>
+          </a:fontRef>
+        </p:style>
+      </p:cxnSp>
+      <p:cxnSp>
+        <p:nvCxnSpPr>
+          <p:cNvPr id="256" name="Straight Arrow Connector 31"/>
+          <p:cNvCxnSpPr>
+            <a:stCxn id="260" idx="3"/>
+            <a:endCxn id="212" idx="7"/>
+          </p:cNvCxnSpPr>
+          <p:nvPr/>
+        </p:nvCxnSpPr>
+        <p:spPr>
+          <a:xfrm flipH="1">
+            <a:off x="9634588" y="3468305"/>
+            <a:ext cx="460724" cy="703576"/>
+          </a:xfrm>
+          <a:prstGeom prst="straightConnector1">
+            <a:avLst/>
+          </a:prstGeom>
+          <a:ln w="38100">
+            <a:solidFill>
+              <a:schemeClr val="accent1"/>
+            </a:solidFill>
+            <a:prstDash val="dash"/>
+            <a:tailEnd type="triangle"/>
+          </a:ln>
+        </p:spPr>
+        <p:style>
+          <a:lnRef idx="1">
+            <a:schemeClr val="accent1"/>
+          </a:lnRef>
+          <a:fillRef idx="0">
+            <a:schemeClr val="accent1"/>
+          </a:fillRef>
+          <a:effectRef idx="0">
+            <a:schemeClr val="accent1"/>
+          </a:effectRef>
+          <a:fontRef idx="minor">
+            <a:schemeClr val="tx1"/>
+          </a:fontRef>
+        </p:style>
+      </p:cxnSp>
+      <p:cxnSp>
+        <p:nvCxnSpPr>
+          <p:cNvPr id="257" name="Straight Arrow Connector 47"/>
+          <p:cNvCxnSpPr>
+            <a:stCxn id="211" idx="0"/>
+            <a:endCxn id="214" idx="4"/>
+          </p:cNvCxnSpPr>
+          <p:nvPr/>
+        </p:nvCxnSpPr>
+        <p:spPr>
+          <a:xfrm flipV="1">
+            <a:off x="7535878" y="3433213"/>
+            <a:ext cx="204950" cy="749613"/>
+          </a:xfrm>
+          <a:prstGeom prst="straightConnector1">
+            <a:avLst/>
+          </a:prstGeom>
+          <a:ln w="38100">
+            <a:tailEnd type="triangle"/>
+          </a:ln>
+        </p:spPr>
+        <p:style>
+          <a:lnRef idx="1">
+            <a:schemeClr val="accent1"/>
+          </a:lnRef>
+          <a:fillRef idx="0">
+            <a:schemeClr val="accent1"/>
+          </a:fillRef>
+          <a:effectRef idx="0">
+            <a:schemeClr val="accent1"/>
+          </a:effectRef>
+          <a:fontRef idx="minor">
+            <a:schemeClr val="tx1"/>
+          </a:fontRef>
+        </p:style>
+      </p:cxnSp>
+      <p:cxnSp>
+        <p:nvCxnSpPr>
+          <p:cNvPr id="258" name="Straight Arrow Connector 47"/>
+          <p:cNvCxnSpPr>
+            <a:stCxn id="212" idx="0"/>
+            <a:endCxn id="215" idx="4"/>
+          </p:cNvCxnSpPr>
+          <p:nvPr/>
+        </p:nvCxnSpPr>
+        <p:spPr>
+          <a:xfrm flipH="1" flipV="1">
+            <a:off x="9350749" y="3377860"/>
+            <a:ext cx="30575" cy="699689"/>
+          </a:xfrm>
+          <a:prstGeom prst="straightConnector1">
+            <a:avLst/>
+          </a:prstGeom>
+          <a:ln w="38100">
+            <a:tailEnd type="triangle"/>
+          </a:ln>
+        </p:spPr>
+        <p:style>
+          <a:lnRef idx="1">
+            <a:schemeClr val="accent1"/>
+          </a:lnRef>
+          <a:fillRef idx="0">
+            <a:schemeClr val="accent1"/>
+          </a:fillRef>
+          <a:effectRef idx="0">
+            <a:schemeClr val="accent1"/>
+          </a:effectRef>
+          <a:fontRef idx="minor">
+            <a:schemeClr val="tx1"/>
+          </a:fontRef>
+        </p:style>
+      </p:cxnSp>
+      <p:sp>
+        <p:nvSpPr>
+          <p:cNvPr id="259" name="Oval 32"/>
+          <p:cNvSpPr/>
+          <p:nvPr/>
+        </p:nvSpPr>
+        <p:spPr>
+          <a:xfrm>
+            <a:off x="6582591" y="3354231"/>
+            <a:ext cx="716339" cy="644141"/>
+          </a:xfrm>
+          <a:prstGeom prst="ellipse">
+            <a:avLst/>
+          </a:prstGeom>
+        </p:spPr>
+        <p:style>
+          <a:lnRef idx="2">
+            <a:schemeClr val="accent1">
+              <a:shade val="50000"/>
+            </a:schemeClr>
+          </a:lnRef>
+          <a:fillRef idx="1">
+            <a:schemeClr val="accent1"/>
+          </a:fillRef>
+          <a:effectRef idx="0">
+            <a:schemeClr val="accent1"/>
+          </a:effectRef>
+          <a:fontRef idx="minor">
+            <a:schemeClr val="lt1"/>
+          </a:fontRef>
+        </p:style>
+        <p:txBody>
+          <a:bodyPr rtlCol="0" anchor="ctr"/>
+          <a:lstStyle/>
+          <a:p>
+            <a:pPr algn="ctr"/>
+            <a:r>
+              <a:rPr lang="en-US" sz="600" dirty="0" smtClean="0"/>
+              <a:t>REWGATE</a:t>
+            </a:r>
+            <a:endParaRPr lang="ru-RU" sz="600" dirty="0"/>
+          </a:p>
+        </p:txBody>
+      </p:sp>
+      <p:sp>
+        <p:nvSpPr>
+          <p:cNvPr id="260" name="Oval 32"/>
+          <p:cNvSpPr/>
+          <p:nvPr/>
+        </p:nvSpPr>
+        <p:spPr>
+          <a:xfrm>
+            <a:off x="9991542" y="2918496"/>
+            <a:ext cx="708587" cy="644141"/>
+          </a:xfrm>
+          <a:prstGeom prst="ellipse">
+            <a:avLst/>
+          </a:prstGeom>
+        </p:spPr>
+        <p:style>
+          <a:lnRef idx="2">
+            <a:schemeClr val="accent1">
+              <a:shade val="50000"/>
+            </a:schemeClr>
+          </a:lnRef>
+          <a:fillRef idx="1">
+            <a:schemeClr val="accent1"/>
+          </a:fillRef>
+          <a:effectRef idx="0">
+            <a:schemeClr val="accent1"/>
+          </a:effectRef>
+          <a:fontRef idx="minor">
+            <a:schemeClr val="lt1"/>
+          </a:fontRef>
+        </p:style>
+        <p:txBody>
+          <a:bodyPr rtlCol="0" anchor="ctr"/>
+          <a:lstStyle/>
+          <a:p>
+            <a:pPr algn="ctr"/>
+            <a:r>
+              <a:rPr lang="en-US" sz="600" dirty="0" smtClean="0"/>
+              <a:t>REWGATE</a:t>
+            </a:r>
+            <a:endParaRPr lang="ru-RU" sz="600" dirty="0"/>
+          </a:p>
+        </p:txBody>
+      </p:sp>
+      <p:sp>
+        <p:nvSpPr>
+          <p:cNvPr id="261" name="Oval 32"/>
+          <p:cNvSpPr/>
+          <p:nvPr/>
+        </p:nvSpPr>
+        <p:spPr>
+          <a:xfrm>
+            <a:off x="8212495" y="3412953"/>
+            <a:ext cx="716339" cy="644141"/>
+          </a:xfrm>
+          <a:prstGeom prst="ellipse">
+            <a:avLst/>
+          </a:prstGeom>
+        </p:spPr>
+        <p:style>
+          <a:lnRef idx="2">
+            <a:schemeClr val="accent1">
+              <a:shade val="50000"/>
+            </a:schemeClr>
+          </a:lnRef>
+          <a:fillRef idx="1">
+            <a:schemeClr val="accent1"/>
+          </a:fillRef>
+          <a:effectRef idx="0">
+            <a:schemeClr val="accent1"/>
+          </a:effectRef>
+          <a:fontRef idx="minor">
+            <a:schemeClr val="lt1"/>
+          </a:fontRef>
+        </p:style>
+        <p:txBody>
+          <a:bodyPr rtlCol="0" anchor="ctr"/>
+          <a:lstStyle/>
+          <a:p>
+            <a:pPr algn="ctr"/>
+            <a:r>
+              <a:rPr lang="en-US" sz="600" dirty="0" smtClean="0"/>
+              <a:t>REWGATE</a:t>
+            </a:r>
+            <a:endParaRPr lang="ru-RU" sz="600" dirty="0"/>
+          </a:p>
+        </p:txBody>
+      </p:sp>
+      <p:cxnSp>
+        <p:nvCxnSpPr>
+          <p:cNvPr id="262" name="Прямая со стрелкой 261"/>
+          <p:cNvCxnSpPr>
+            <a:stCxn id="213" idx="5"/>
+            <a:endCxn id="259" idx="1"/>
+          </p:cNvCxnSpPr>
+          <p:nvPr/>
+        </p:nvCxnSpPr>
+        <p:spPr>
+          <a:xfrm>
+            <a:off x="6323391" y="3326324"/>
+            <a:ext cx="364105" cy="122239"/>
+          </a:xfrm>
+          <a:prstGeom prst="straightConnector1">
+            <a:avLst/>
+          </a:prstGeom>
+          <a:ln>
+            <a:solidFill>
+              <a:srgbClr val="00B050"/>
+            </a:solidFill>
+            <a:tailEnd type="triangle"/>
+          </a:ln>
+        </p:spPr>
+        <p:style>
+          <a:lnRef idx="1">
+            <a:schemeClr val="accent1"/>
+          </a:lnRef>
+          <a:fillRef idx="0">
+            <a:schemeClr val="accent1"/>
+          </a:fillRef>
+          <a:effectRef idx="0">
+            <a:schemeClr val="accent1"/>
+          </a:effectRef>
+          <a:fontRef idx="minor">
+            <a:schemeClr val="tx1"/>
+          </a:fontRef>
+        </p:style>
+      </p:cxnSp>
+      <p:cxnSp>
+        <p:nvCxnSpPr>
+          <p:cNvPr id="263" name="Прямая со стрелкой 262"/>
+          <p:cNvCxnSpPr>
+            <a:stCxn id="215" idx="6"/>
+            <a:endCxn id="260" idx="2"/>
+          </p:cNvCxnSpPr>
+          <p:nvPr/>
+        </p:nvCxnSpPr>
+        <p:spPr>
+          <a:xfrm>
+            <a:off x="9708918" y="3055790"/>
+            <a:ext cx="282624" cy="184777"/>
+          </a:xfrm>
+          <a:prstGeom prst="straightConnector1">
+            <a:avLst/>
+          </a:prstGeom>
+          <a:ln>
+            <a:solidFill>
+              <a:srgbClr val="00B050"/>
+            </a:solidFill>
+            <a:tailEnd type="triangle"/>
+          </a:ln>
+        </p:spPr>
+        <p:style>
+          <a:lnRef idx="1">
+            <a:schemeClr val="accent1"/>
+          </a:lnRef>
+          <a:fillRef idx="0">
+            <a:schemeClr val="accent1"/>
+          </a:fillRef>
+          <a:effectRef idx="0">
+            <a:schemeClr val="accent1"/>
+          </a:effectRef>
+          <a:fontRef idx="minor">
+            <a:schemeClr val="tx1"/>
+          </a:fontRef>
+        </p:style>
+      </p:cxnSp>
+      <p:cxnSp>
+        <p:nvCxnSpPr>
+          <p:cNvPr id="264" name="Прямая со стрелкой 263"/>
+          <p:cNvCxnSpPr>
+            <a:stCxn id="214" idx="5"/>
+            <a:endCxn id="261" idx="1"/>
+          </p:cNvCxnSpPr>
+          <p:nvPr/>
+        </p:nvCxnSpPr>
+        <p:spPr>
+          <a:xfrm>
+            <a:off x="7994092" y="3338881"/>
+            <a:ext cx="323308" cy="168404"/>
+          </a:xfrm>
+          <a:prstGeom prst="straightConnector1">
+            <a:avLst/>
+          </a:prstGeom>
+          <a:ln>
+            <a:solidFill>
+              <a:srgbClr val="00B050"/>
+            </a:solidFill>
+            <a:tailEnd type="triangle"/>
+          </a:ln>
+        </p:spPr>
+        <p:style>
+          <a:lnRef idx="1">
+            <a:schemeClr val="accent1"/>
+          </a:lnRef>
+          <a:fillRef idx="0">
+            <a:schemeClr val="accent1"/>
+          </a:fillRef>
+          <a:effectRef idx="0">
+            <a:schemeClr val="accent1"/>
+          </a:effectRef>
+          <a:fontRef idx="minor">
+            <a:schemeClr val="tx1"/>
+          </a:fontRef>
+        </p:style>
+      </p:cxnSp>
+      <p:sp>
+        <p:nvSpPr>
+          <p:cNvPr id="265" name="TextBox 264"/>
+          <p:cNvSpPr txBox="1"/>
+          <p:nvPr/>
+        </p:nvSpPr>
+        <p:spPr>
+          <a:xfrm>
+            <a:off x="9708918" y="3129860"/>
+            <a:ext cx="272444" cy="253916"/>
+          </a:xfrm>
+          <a:prstGeom prst="rect">
+            <a:avLst/>
+          </a:prstGeom>
+          <a:noFill/>
+        </p:spPr>
+        <p:txBody>
+          <a:bodyPr wrap="square" rtlCol="0">
+            <a:spAutoFit/>
+          </a:bodyPr>
+          <a:lstStyle/>
+          <a:p>
+            <a:r>
+              <a:rPr lang="en-US" sz="1050" dirty="0" smtClean="0"/>
+              <a:t>L</a:t>
+            </a:r>
+            <a:endParaRPr lang="en-US" sz="1050" dirty="0"/>
+          </a:p>
+        </p:txBody>
+      </p:sp>
+      <p:sp>
+        <p:nvSpPr>
+          <p:cNvPr id="266" name="TextBox 265"/>
+          <p:cNvSpPr txBox="1"/>
+          <p:nvPr/>
+        </p:nvSpPr>
+        <p:spPr>
+          <a:xfrm>
+            <a:off x="8570665" y="2857226"/>
+            <a:ext cx="272444" cy="253916"/>
+          </a:xfrm>
+          <a:prstGeom prst="rect">
+            <a:avLst/>
+          </a:prstGeom>
+          <a:noFill/>
+        </p:spPr>
+        <p:txBody>
+          <a:bodyPr wrap="square" rtlCol="0">
+            <a:spAutoFit/>
+          </a:bodyPr>
+          <a:lstStyle/>
+          <a:p>
+            <a:r>
+              <a:rPr lang="en-US" sz="1050" dirty="0" smtClean="0"/>
+              <a:t>L</a:t>
+            </a:r>
+            <a:endParaRPr lang="en-US" sz="1050" dirty="0"/>
+          </a:p>
+        </p:txBody>
+      </p:sp>
+      <p:sp>
+        <p:nvSpPr>
+          <p:cNvPr id="270" name="Oval 32"/>
+          <p:cNvSpPr/>
+          <p:nvPr/>
+        </p:nvSpPr>
+        <p:spPr>
+          <a:xfrm>
+            <a:off x="6672439" y="255282"/>
+            <a:ext cx="716339" cy="644141"/>
+          </a:xfrm>
+          <a:prstGeom prst="ellipse">
+            <a:avLst/>
+          </a:prstGeom>
+          <a:ln>
+            <a:solidFill>
+              <a:srgbClr val="FF0000"/>
+            </a:solidFill>
+          </a:ln>
+        </p:spPr>
+        <p:style>
+          <a:lnRef idx="2">
+            <a:schemeClr val="accent1">
+              <a:shade val="50000"/>
+            </a:schemeClr>
+          </a:lnRef>
+          <a:fillRef idx="1">
+            <a:schemeClr val="accent1"/>
+          </a:fillRef>
+          <a:effectRef idx="0">
+            <a:schemeClr val="accent1"/>
+          </a:effectRef>
+          <a:fontRef idx="minor">
+            <a:schemeClr val="lt1"/>
+          </a:fontRef>
+        </p:style>
+        <p:txBody>
+          <a:bodyPr rtlCol="0" anchor="ctr"/>
+          <a:lstStyle/>
+          <a:p>
+            <a:pPr algn="ctr"/>
+            <a:r>
+              <a:rPr lang="en-US" sz="1100" dirty="0" smtClean="0"/>
+              <a:t>REWBIAS</a:t>
+            </a:r>
+            <a:endParaRPr lang="ru-RU" sz="1100" dirty="0"/>
+          </a:p>
+        </p:txBody>
+      </p:sp>
+      <p:cxnSp>
+        <p:nvCxnSpPr>
+          <p:cNvPr id="271" name="Straight Arrow Connector 47"/>
+          <p:cNvCxnSpPr>
+            <a:stCxn id="112" idx="6"/>
+            <a:endCxn id="270" idx="2"/>
+          </p:cNvCxnSpPr>
+          <p:nvPr/>
+        </p:nvCxnSpPr>
+        <p:spPr>
+          <a:xfrm>
+            <a:off x="6193869" y="551947"/>
+            <a:ext cx="478570" cy="25406"/>
+          </a:xfrm>
+          <a:prstGeom prst="straightConnector1">
+            <a:avLst/>
+          </a:prstGeom>
+          <a:ln w="38100">
+            <a:tailEnd type="triangle"/>
+          </a:ln>
+        </p:spPr>
+        <p:style>
+          <a:lnRef idx="1">
+            <a:schemeClr val="accent1"/>
+          </a:lnRef>
+          <a:fillRef idx="0">
+            <a:schemeClr val="accent1"/>
+          </a:fillRef>
+          <a:effectRef idx="0">
+            <a:schemeClr val="accent1"/>
+          </a:effectRef>
+          <a:fontRef idx="minor">
+            <a:schemeClr val="tx1"/>
+          </a:fontRef>
+        </p:style>
+      </p:cxnSp>
+      <p:cxnSp>
+        <p:nvCxnSpPr>
+          <p:cNvPr id="274" name="Прямая со стрелкой 273"/>
+          <p:cNvCxnSpPr>
+            <a:stCxn id="270" idx="6"/>
+            <a:endCxn id="177" idx="2"/>
+          </p:cNvCxnSpPr>
+          <p:nvPr/>
+        </p:nvCxnSpPr>
+        <p:spPr>
+          <a:xfrm flipV="1">
+            <a:off x="7388778" y="478123"/>
+            <a:ext cx="3488785" cy="99230"/>
+          </a:xfrm>
+          <a:prstGeom prst="straightConnector1">
+            <a:avLst/>
+          </a:prstGeom>
+          <a:ln>
+            <a:solidFill>
+              <a:schemeClr val="tx1"/>
+            </a:solidFill>
+            <a:headEnd type="none"/>
+            <a:tailEnd type="triangle"/>
+          </a:ln>
+        </p:spPr>
+        <p:style>
+          <a:lnRef idx="1">
+            <a:schemeClr val="accent1"/>
+          </a:lnRef>
+          <a:fillRef idx="0">
+            <a:schemeClr val="accent1"/>
+          </a:fillRef>
+          <a:effectRef idx="0">
+            <a:schemeClr val="accent1"/>
+          </a:effectRef>
+          <a:fontRef idx="minor">
+            <a:schemeClr val="tx1"/>
+          </a:fontRef>
+        </p:style>
+      </p:cxnSp>
+      <p:cxnSp>
+        <p:nvCxnSpPr>
+          <p:cNvPr id="277" name="Straight Arrow Connector 47"/>
+          <p:cNvCxnSpPr>
+            <a:stCxn id="112" idx="5"/>
+            <a:endCxn id="261" idx="0"/>
+          </p:cNvCxnSpPr>
+          <p:nvPr/>
+        </p:nvCxnSpPr>
+        <p:spPr>
+          <a:xfrm>
+            <a:off x="6088964" y="779685"/>
+            <a:ext cx="2481701" cy="2633268"/>
+          </a:xfrm>
+          <a:prstGeom prst="straightConnector1">
+            <a:avLst/>
+          </a:prstGeom>
+          <a:ln w="38100">
+            <a:tailEnd type="triangle"/>
+          </a:ln>
+        </p:spPr>
+        <p:style>
+          <a:lnRef idx="1">
+            <a:schemeClr val="accent1"/>
+          </a:lnRef>
+          <a:fillRef idx="0">
+            <a:schemeClr val="accent1"/>
+          </a:fillRef>
+          <a:effectRef idx="0">
+            <a:schemeClr val="accent1"/>
+          </a:effectRef>
+          <a:fontRef idx="minor">
+            <a:schemeClr val="tx1"/>
+          </a:fontRef>
+        </p:style>
+      </p:cxnSp>
+      <p:cxnSp>
+        <p:nvCxnSpPr>
+          <p:cNvPr id="278" name="Straight Arrow Connector 47"/>
+          <p:cNvCxnSpPr>
+            <a:stCxn id="112" idx="5"/>
+            <a:endCxn id="259" idx="0"/>
+          </p:cNvCxnSpPr>
+          <p:nvPr/>
+        </p:nvCxnSpPr>
+        <p:spPr>
+          <a:xfrm>
+            <a:off x="6088964" y="779685"/>
+            <a:ext cx="851797" cy="2574546"/>
+          </a:xfrm>
+          <a:prstGeom prst="straightConnector1">
+            <a:avLst/>
+          </a:prstGeom>
+          <a:ln w="38100">
+            <a:tailEnd type="triangle"/>
+          </a:ln>
+        </p:spPr>
+        <p:style>
+          <a:lnRef idx="1">
+            <a:schemeClr val="accent1"/>
+          </a:lnRef>
+          <a:fillRef idx="0">
+            <a:schemeClr val="accent1"/>
+          </a:fillRef>
+          <a:effectRef idx="0">
+            <a:schemeClr val="accent1"/>
+          </a:effectRef>
+          <a:fontRef idx="minor">
+            <a:schemeClr val="tx1"/>
+          </a:fontRef>
+        </p:style>
+      </p:cxnSp>
+      <p:cxnSp>
+        <p:nvCxnSpPr>
+          <p:cNvPr id="279" name="Straight Arrow Connector 47"/>
+          <p:cNvCxnSpPr>
+            <a:stCxn id="112" idx="5"/>
+            <a:endCxn id="260" idx="0"/>
+          </p:cNvCxnSpPr>
+          <p:nvPr/>
+        </p:nvCxnSpPr>
+        <p:spPr>
+          <a:xfrm>
+            <a:off x="6088964" y="779685"/>
+            <a:ext cx="4256872" cy="2138811"/>
+          </a:xfrm>
+          <a:prstGeom prst="straightConnector1">
+            <a:avLst/>
+          </a:prstGeom>
+          <a:ln w="38100">
+            <a:tailEnd type="triangle"/>
+          </a:ln>
+        </p:spPr>
+        <p:style>
+          <a:lnRef idx="1">
+            <a:schemeClr val="accent1"/>
+          </a:lnRef>
+          <a:fillRef idx="0">
+            <a:schemeClr val="accent1"/>
+          </a:fillRef>
+          <a:effectRef idx="0">
+            <a:schemeClr val="accent1"/>
+          </a:effectRef>
+          <a:fontRef idx="minor">
+            <a:schemeClr val="tx1"/>
+          </a:fontRef>
+        </p:style>
+      </p:cxnSp>
+      <p:cxnSp>
+        <p:nvCxnSpPr>
+          <p:cNvPr id="286" name="Straight Arrow Connector 47"/>
+          <p:cNvCxnSpPr>
+            <a:stCxn id="270" idx="4"/>
+            <a:endCxn id="261" idx="0"/>
+          </p:cNvCxnSpPr>
+          <p:nvPr/>
+        </p:nvCxnSpPr>
+        <p:spPr>
+          <a:xfrm>
+            <a:off x="7030609" y="899423"/>
+            <a:ext cx="1540056" cy="2513530"/>
+          </a:xfrm>
+          <a:prstGeom prst="straightConnector1">
+            <a:avLst/>
+          </a:prstGeom>
+          <a:ln w="38100">
+            <a:tailEnd type="triangle"/>
+          </a:ln>
+        </p:spPr>
+        <p:style>
+          <a:lnRef idx="1">
+            <a:schemeClr val="accent1"/>
+          </a:lnRef>
+          <a:fillRef idx="0">
+            <a:schemeClr val="accent1"/>
+          </a:fillRef>
+          <a:effectRef idx="0">
+            <a:schemeClr val="accent1"/>
+          </a:effectRef>
+          <a:fontRef idx="minor">
+            <a:schemeClr val="tx1"/>
+          </a:fontRef>
+        </p:style>
+      </p:cxnSp>
+      <p:cxnSp>
+        <p:nvCxnSpPr>
+          <p:cNvPr id="287" name="Straight Arrow Connector 47"/>
+          <p:cNvCxnSpPr>
+            <a:stCxn id="270" idx="4"/>
+          </p:cNvCxnSpPr>
+          <p:nvPr/>
+        </p:nvCxnSpPr>
+        <p:spPr>
+          <a:xfrm flipH="1">
+            <a:off x="6940760" y="899423"/>
+            <a:ext cx="89849" cy="2568882"/>
+          </a:xfrm>
+          <a:prstGeom prst="straightConnector1">
+            <a:avLst/>
+          </a:prstGeom>
+          <a:ln w="38100">
+            <a:tailEnd type="triangle"/>
+          </a:ln>
+        </p:spPr>
+        <p:style>
+          <a:lnRef idx="1">
+            <a:schemeClr val="accent1"/>
+          </a:lnRef>
+          <a:fillRef idx="0">
+            <a:schemeClr val="accent1"/>
+          </a:fillRef>
+          <a:effectRef idx="0">
+            <a:schemeClr val="accent1"/>
+          </a:effectRef>
+          <a:fontRef idx="minor">
+            <a:schemeClr val="tx1"/>
+          </a:fontRef>
+        </p:style>
+      </p:cxnSp>
+      <p:cxnSp>
+        <p:nvCxnSpPr>
+          <p:cNvPr id="288" name="Straight Arrow Connector 47"/>
+          <p:cNvCxnSpPr>
+            <a:stCxn id="270" idx="4"/>
+            <a:endCxn id="260" idx="0"/>
+          </p:cNvCxnSpPr>
+          <p:nvPr/>
+        </p:nvCxnSpPr>
+        <p:spPr>
+          <a:xfrm>
+            <a:off x="7030609" y="899423"/>
+            <a:ext cx="3315227" cy="2019073"/>
+          </a:xfrm>
+          <a:prstGeom prst="straightConnector1">
+            <a:avLst/>
+          </a:prstGeom>
+          <a:ln w="38100">
+            <a:tailEnd type="triangle"/>
+          </a:ln>
+        </p:spPr>
+        <p:style>
+          <a:lnRef idx="1">
+            <a:schemeClr val="accent1"/>
+          </a:lnRef>
+          <a:fillRef idx="0">
+            <a:schemeClr val="accent1"/>
+          </a:fillRef>
+          <a:effectRef idx="0">
+            <a:schemeClr val="accent1"/>
+          </a:effectRef>
+          <a:fontRef idx="minor">
+            <a:schemeClr val="tx1"/>
+          </a:fontRef>
+        </p:style>
+      </p:cxnSp>
+      <p:cxnSp>
+        <p:nvCxnSpPr>
+          <p:cNvPr id="295" name="Прямая со стрелкой 294"/>
+          <p:cNvCxnSpPr>
+            <a:stCxn id="270" idx="3"/>
+            <a:endCxn id="210" idx="7"/>
+          </p:cNvCxnSpPr>
+          <p:nvPr/>
+        </p:nvCxnSpPr>
+        <p:spPr>
+          <a:xfrm flipH="1">
+            <a:off x="6389870" y="805091"/>
+            <a:ext cx="387474" cy="3401687"/>
+          </a:xfrm>
+          <a:prstGeom prst="straightConnector1">
+            <a:avLst/>
+          </a:prstGeom>
+          <a:ln w="15875">
+            <a:tailEnd type="arrow"/>
+          </a:ln>
+        </p:spPr>
+        <p:style>
+          <a:lnRef idx="1">
+            <a:schemeClr val="accent1"/>
+          </a:lnRef>
+          <a:fillRef idx="0">
+            <a:schemeClr val="accent1"/>
+          </a:fillRef>
+          <a:effectRef idx="0">
+            <a:schemeClr val="accent1"/>
+          </a:effectRef>
+          <a:fontRef idx="minor">
+            <a:schemeClr val="tx1"/>
+          </a:fontRef>
+        </p:style>
+      </p:cxnSp>
+      <p:cxnSp>
+        <p:nvCxnSpPr>
+          <p:cNvPr id="296" name="Прямая со стрелкой 295"/>
+          <p:cNvCxnSpPr>
+            <a:stCxn id="270" idx="5"/>
+            <a:endCxn id="211" idx="0"/>
+          </p:cNvCxnSpPr>
+          <p:nvPr/>
+        </p:nvCxnSpPr>
+        <p:spPr>
+          <a:xfrm>
+            <a:off x="7283873" y="805091"/>
+            <a:ext cx="252005" cy="3377735"/>
+          </a:xfrm>
+          <a:prstGeom prst="straightConnector1">
+            <a:avLst/>
+          </a:prstGeom>
+          <a:ln w="15875">
+            <a:tailEnd type="arrow"/>
+          </a:ln>
+        </p:spPr>
+        <p:style>
+          <a:lnRef idx="1">
+            <a:schemeClr val="accent1"/>
+          </a:lnRef>
+          <a:fillRef idx="0">
+            <a:schemeClr val="accent1"/>
+          </a:fillRef>
+          <a:effectRef idx="0">
+            <a:schemeClr val="accent1"/>
+          </a:effectRef>
+          <a:fontRef idx="minor">
+            <a:schemeClr val="tx1"/>
+          </a:fontRef>
+        </p:style>
+      </p:cxnSp>
+      <p:cxnSp>
+        <p:nvCxnSpPr>
+          <p:cNvPr id="297" name="Прямая со стрелкой 296"/>
+          <p:cNvCxnSpPr>
+            <a:stCxn id="270" idx="5"/>
+            <a:endCxn id="212" idx="0"/>
+          </p:cNvCxnSpPr>
+          <p:nvPr/>
+        </p:nvCxnSpPr>
+        <p:spPr>
+          <a:xfrm>
+            <a:off x="7283873" y="805091"/>
+            <a:ext cx="2097451" cy="3272458"/>
+          </a:xfrm>
+          <a:prstGeom prst="straightConnector1">
+            <a:avLst/>
+          </a:prstGeom>
+          <a:ln w="15875">
+            <a:tailEnd type="arrow"/>
+          </a:ln>
+        </p:spPr>
+        <p:style>
+          <a:lnRef idx="1">
+            <a:schemeClr val="accent1"/>
+          </a:lnRef>
+          <a:fillRef idx="0">
+            <a:schemeClr val="accent1"/>
+          </a:fillRef>
+          <a:effectRef idx="0">
+            <a:schemeClr val="accent1"/>
+          </a:effectRef>
+          <a:fontRef idx="minor">
+            <a:schemeClr val="tx1"/>
+          </a:fontRef>
+        </p:style>
+      </p:cxnSp>
+      <p:cxnSp>
+        <p:nvCxnSpPr>
+          <p:cNvPr id="313" name="Straight Arrow Connector 47"/>
+          <p:cNvCxnSpPr>
+            <a:stCxn id="213" idx="7"/>
+            <a:endCxn id="172" idx="2"/>
+          </p:cNvCxnSpPr>
+          <p:nvPr/>
+        </p:nvCxnSpPr>
+        <p:spPr>
+          <a:xfrm flipV="1">
+            <a:off x="6323391" y="1849090"/>
+            <a:ext cx="4359168" cy="1021757"/>
+          </a:xfrm>
+          <a:prstGeom prst="straightConnector1">
+            <a:avLst/>
+          </a:prstGeom>
+          <a:ln w="38100">
+            <a:tailEnd type="triangle"/>
+          </a:ln>
+        </p:spPr>
+        <p:style>
+          <a:lnRef idx="1">
+            <a:schemeClr val="accent1"/>
+          </a:lnRef>
+          <a:fillRef idx="0">
+            <a:schemeClr val="accent1"/>
+          </a:fillRef>
+          <a:effectRef idx="0">
+            <a:schemeClr val="accent1"/>
+          </a:effectRef>
+          <a:fontRef idx="minor">
+            <a:schemeClr val="tx1"/>
+          </a:fontRef>
+        </p:style>
+      </p:cxnSp>
+      <p:cxnSp>
+        <p:nvCxnSpPr>
+          <p:cNvPr id="314" name="Straight Arrow Connector 47"/>
+          <p:cNvCxnSpPr>
+            <a:stCxn id="214" idx="7"/>
+            <a:endCxn id="172" idx="2"/>
+          </p:cNvCxnSpPr>
+          <p:nvPr/>
+        </p:nvCxnSpPr>
+        <p:spPr>
+          <a:xfrm flipV="1">
+            <a:off x="7994092" y="1849090"/>
+            <a:ext cx="2688467" cy="1034314"/>
+          </a:xfrm>
+          <a:prstGeom prst="straightConnector1">
+            <a:avLst/>
+          </a:prstGeom>
+          <a:ln w="38100">
+            <a:tailEnd type="triangle"/>
+          </a:ln>
+        </p:spPr>
+        <p:style>
+          <a:lnRef idx="1">
+            <a:schemeClr val="accent1"/>
+          </a:lnRef>
+          <a:fillRef idx="0">
+            <a:schemeClr val="accent1"/>
+          </a:fillRef>
+          <a:effectRef idx="0">
+            <a:schemeClr val="accent1"/>
+          </a:effectRef>
+          <a:fontRef idx="minor">
+            <a:schemeClr val="tx1"/>
+          </a:fontRef>
+        </p:style>
+      </p:cxnSp>
+      <p:cxnSp>
+        <p:nvCxnSpPr>
+          <p:cNvPr id="315" name="Straight Arrow Connector 47"/>
+          <p:cNvCxnSpPr>
+            <a:stCxn id="215" idx="7"/>
+            <a:endCxn id="172" idx="2"/>
+          </p:cNvCxnSpPr>
+          <p:nvPr/>
+        </p:nvCxnSpPr>
+        <p:spPr>
+          <a:xfrm flipV="1">
+            <a:off x="9604013" y="1849090"/>
+            <a:ext cx="1078546" cy="978961"/>
+          </a:xfrm>
+          <a:prstGeom prst="straightConnector1">
+            <a:avLst/>
+          </a:prstGeom>
+          <a:ln w="38100">
+            <a:tailEnd type="triangle"/>
+          </a:ln>
+        </p:spPr>
+        <p:style>
+          <a:lnRef idx="1">
+            <a:schemeClr val="accent1"/>
+          </a:lnRef>
+          <a:fillRef idx="0">
+            <a:schemeClr val="accent1"/>
+          </a:fillRef>
+          <a:effectRef idx="0">
+            <a:schemeClr val="accent1"/>
+          </a:effectRef>
+          <a:fontRef idx="minor">
+            <a:schemeClr val="tx1"/>
+          </a:fontRef>
+        </p:style>
+      </p:cxnSp>
+      <p:cxnSp>
+        <p:nvCxnSpPr>
+          <p:cNvPr id="322" name="Прямая со стрелкой 321"/>
+          <p:cNvCxnSpPr>
+            <a:stCxn id="215" idx="0"/>
+          </p:cNvCxnSpPr>
+          <p:nvPr/>
+        </p:nvCxnSpPr>
+        <p:spPr>
+          <a:xfrm flipH="1" flipV="1">
+            <a:off x="7409875" y="670878"/>
+            <a:ext cx="1940874" cy="2062841"/>
+          </a:xfrm>
+          <a:prstGeom prst="straightConnector1">
+            <a:avLst/>
+          </a:prstGeom>
+          <a:ln>
+            <a:solidFill>
+              <a:schemeClr val="tx1"/>
+            </a:solidFill>
+            <a:headEnd type="none"/>
+            <a:tailEnd type="triangle"/>
+          </a:ln>
+        </p:spPr>
+        <p:style>
+          <a:lnRef idx="1">
+            <a:schemeClr val="accent1"/>
+          </a:lnRef>
+          <a:fillRef idx="0">
+            <a:schemeClr val="accent1"/>
+          </a:fillRef>
+          <a:effectRef idx="0">
+            <a:schemeClr val="accent1"/>
+          </a:effectRef>
+          <a:fontRef idx="minor">
+            <a:schemeClr val="tx1"/>
+          </a:fontRef>
+        </p:style>
+      </p:cxnSp>
+      <p:cxnSp>
+        <p:nvCxnSpPr>
+          <p:cNvPr id="323" name="Прямая со стрелкой 322"/>
+          <p:cNvCxnSpPr>
+            <a:stCxn id="213" idx="0"/>
+            <a:endCxn id="270" idx="2"/>
+          </p:cNvCxnSpPr>
+          <p:nvPr/>
+        </p:nvCxnSpPr>
+        <p:spPr>
+          <a:xfrm flipV="1">
+            <a:off x="6070127" y="577353"/>
+            <a:ext cx="602312" cy="2199162"/>
+          </a:xfrm>
+          <a:prstGeom prst="straightConnector1">
+            <a:avLst/>
+          </a:prstGeom>
+          <a:ln>
+            <a:solidFill>
+              <a:schemeClr val="tx1"/>
+            </a:solidFill>
+            <a:headEnd type="none"/>
+            <a:tailEnd type="triangle"/>
+          </a:ln>
+        </p:spPr>
+        <p:style>
+          <a:lnRef idx="1">
+            <a:schemeClr val="accent1"/>
+          </a:lnRef>
+          <a:fillRef idx="0">
+            <a:schemeClr val="accent1"/>
+          </a:fillRef>
+          <a:effectRef idx="0">
+            <a:schemeClr val="accent1"/>
+          </a:effectRef>
+          <a:fontRef idx="minor">
+            <a:schemeClr val="tx1"/>
+          </a:fontRef>
+        </p:style>
+      </p:cxnSp>
+      <p:cxnSp>
+        <p:nvCxnSpPr>
+          <p:cNvPr id="324" name="Прямая со стрелкой 323"/>
+          <p:cNvCxnSpPr>
+            <a:stCxn id="214" idx="0"/>
+          </p:cNvCxnSpPr>
+          <p:nvPr/>
+        </p:nvCxnSpPr>
+        <p:spPr>
+          <a:xfrm flipH="1" flipV="1">
+            <a:off x="7409875" y="705861"/>
+            <a:ext cx="330953" cy="2083211"/>
+          </a:xfrm>
+          <a:prstGeom prst="straightConnector1">
+            <a:avLst/>
+          </a:prstGeom>
+          <a:ln>
+            <a:solidFill>
+              <a:schemeClr val="tx1"/>
+            </a:solidFill>
+            <a:headEnd type="none"/>
+            <a:tailEnd type="triangle"/>
+          </a:ln>
+        </p:spPr>
+        <p:style>
+          <a:lnRef idx="1">
+            <a:schemeClr val="accent1"/>
+          </a:lnRef>
+          <a:fillRef idx="0">
+            <a:schemeClr val="accent1"/>
+          </a:fillRef>
+          <a:effectRef idx="0">
+            <a:schemeClr val="accent1"/>
+          </a:effectRef>
+          <a:fontRef idx="minor">
+            <a:schemeClr val="tx1"/>
+          </a:fontRef>
+        </p:style>
+      </p:cxnSp>
+    </p:spTree>
+    <p:extLst>
+      <p:ext uri="{BB962C8B-B14F-4D97-AF65-F5344CB8AC3E}">
+        <p14:creationId xmlns:p14="http://schemas.microsoft.com/office/powerpoint/2010/main" val="3332039629"/>
+      </p:ext>
+    </p:extLst>
+  </p:cSld>
+  <p:clrMapOvr>
+    <a:masterClrMapping/>
+  </p:clrMapOvr>
+  <p:timing>
+    <p:tnLst>
+      <p:par>
+        <p:cTn id="1" dur="indefinite" restart="never" nodeType="tmRoot"/>
+      </p:par>
+    </p:tnLst>
+  </p:timing>
+</p:sld>
+</file>
+
+<file path=ppt/slides/slide5.xml><?xml version="1.0" encoding="utf-8"?>
+<p:sld xmlns:a="http://schemas.openxmlformats.org/drawingml/2006/main" xmlns:r="http://schemas.openxmlformats.org/officeDocument/2006/relationships" xmlns:p="http://schemas.openxmlformats.org/presentationml/2006/main">
+  <p:cSld>
+    <p:spTree>
+      <p:nvGrpSpPr>
+        <p:cNvPr id="1" name=""/>
+        <p:cNvGrpSpPr/>
+        <p:nvPr/>
+      </p:nvGrpSpPr>
+      <p:grpSpPr>
+        <a:xfrm>
+          <a:off x="0" y="0"/>
+          <a:ext cx="0" cy="0"/>
+          <a:chOff x="0" y="0"/>
+          <a:chExt cx="0" cy="0"/>
+        </a:xfrm>
+      </p:grpSpPr>
+      <p:sp>
+        <p:nvSpPr>
           <p:cNvPr id="2" name="Oval 32"/>
           <p:cNvSpPr/>
           <p:nvPr/>
@@ -14478,6 +18950,13 @@
   <p:clrMapOvr>
     <a:masterClrMapping/>
   </p:clrMapOvr>
+  <p:timing>
+    <p:tnLst>
+      <p:par>
+        <p:cTn id="1" dur="indefinite" restart="never" nodeType="tmRoot"/>
+      </p:par>
+    </p:tnLst>
+  </p:timing>
 </p:sld>
 </file>
 
@@ -14736,7 +19215,7 @@
   <a:extraClrSchemeLst/>
   <a:extLst>
     <a:ext uri="{05A4C25C-085E-4340-85A3-A5531E510DB2}">
-      <thm15:themeFamily xmlns:thm15="http://schemas.microsoft.com/office/thememl/2012/main" xmlns="" name="Office Theme" id="{62F939B6-93AF-4DB8-9C6B-D6C7DFDC589F}" vid="{4A3C46E8-61CC-4603-A589-7422A47A8E4A}"/>
+      <thm15:themeFamily xmlns="" xmlns:thm15="http://schemas.microsoft.com/office/thememl/2012/main" name="Office Theme" id="{62F939B6-93AF-4DB8-9C6B-D6C7DFDC589F}" vid="{4A3C46E8-61CC-4603-A589-7422A47A8E4A}"/>
     </a:ext>
   </a:extLst>
 </a:theme>

</xml_diff>

<commit_message>
Updated architecture for intermediate goal inference
</commit_message>
<xml_diff>
--- a/dy.pptx
+++ b/dy.pptx
@@ -110,7 +110,7 @@
   </p:defaultTextStyle>
   <p:extLst>
     <p:ext uri="{EFAFB233-063F-42B5-8137-9DF3F51BA10A}">
-      <p15:sldGuideLst xmlns="" xmlns:p15="http://schemas.microsoft.com/office/powerpoint/2012/main"/>
+      <p15:sldGuideLst xmlns:p15="http://schemas.microsoft.com/office/powerpoint/2012/main" xmlns=""/>
     </p:ext>
   </p:extLst>
 </p:presentation>
@@ -247,7 +247,7 @@
           <a:p>
             <a:fld id="{3A4BDD1D-B22B-4ED6-A560-FD2CA5D857D7}" type="datetimeFigureOut">
               <a:rPr lang="ru-RU" smtClean="0"/>
-              <a:t>19.02.2024</a:t>
+              <a:t>27.02.2024</a:t>
             </a:fld>
             <a:endParaRPr lang="ru-RU"/>
           </a:p>
@@ -417,7 +417,7 @@
           <a:p>
             <a:fld id="{3A4BDD1D-B22B-4ED6-A560-FD2CA5D857D7}" type="datetimeFigureOut">
               <a:rPr lang="ru-RU" smtClean="0"/>
-              <a:t>19.02.2024</a:t>
+              <a:t>27.02.2024</a:t>
             </a:fld>
             <a:endParaRPr lang="ru-RU"/>
           </a:p>
@@ -597,7 +597,7 @@
           <a:p>
             <a:fld id="{3A4BDD1D-B22B-4ED6-A560-FD2CA5D857D7}" type="datetimeFigureOut">
               <a:rPr lang="ru-RU" smtClean="0"/>
-              <a:t>19.02.2024</a:t>
+              <a:t>27.02.2024</a:t>
             </a:fld>
             <a:endParaRPr lang="ru-RU"/>
           </a:p>
@@ -767,7 +767,7 @@
           <a:p>
             <a:fld id="{3A4BDD1D-B22B-4ED6-A560-FD2CA5D857D7}" type="datetimeFigureOut">
               <a:rPr lang="ru-RU" smtClean="0"/>
-              <a:t>19.02.2024</a:t>
+              <a:t>27.02.2024</a:t>
             </a:fld>
             <a:endParaRPr lang="ru-RU"/>
           </a:p>
@@ -1013,7 +1013,7 @@
           <a:p>
             <a:fld id="{3A4BDD1D-B22B-4ED6-A560-FD2CA5D857D7}" type="datetimeFigureOut">
               <a:rPr lang="ru-RU" smtClean="0"/>
-              <a:t>19.02.2024</a:t>
+              <a:t>27.02.2024</a:t>
             </a:fld>
             <a:endParaRPr lang="ru-RU"/>
           </a:p>
@@ -1245,7 +1245,7 @@
           <a:p>
             <a:fld id="{3A4BDD1D-B22B-4ED6-A560-FD2CA5D857D7}" type="datetimeFigureOut">
               <a:rPr lang="ru-RU" smtClean="0"/>
-              <a:t>19.02.2024</a:t>
+              <a:t>27.02.2024</a:t>
             </a:fld>
             <a:endParaRPr lang="ru-RU"/>
           </a:p>
@@ -1612,7 +1612,7 @@
           <a:p>
             <a:fld id="{3A4BDD1D-B22B-4ED6-A560-FD2CA5D857D7}" type="datetimeFigureOut">
               <a:rPr lang="ru-RU" smtClean="0"/>
-              <a:t>19.02.2024</a:t>
+              <a:t>27.02.2024</a:t>
             </a:fld>
             <a:endParaRPr lang="ru-RU"/>
           </a:p>
@@ -1730,7 +1730,7 @@
           <a:p>
             <a:fld id="{3A4BDD1D-B22B-4ED6-A560-FD2CA5D857D7}" type="datetimeFigureOut">
               <a:rPr lang="ru-RU" smtClean="0"/>
-              <a:t>19.02.2024</a:t>
+              <a:t>27.02.2024</a:t>
             </a:fld>
             <a:endParaRPr lang="ru-RU"/>
           </a:p>
@@ -1825,7 +1825,7 @@
           <a:p>
             <a:fld id="{3A4BDD1D-B22B-4ED6-A560-FD2CA5D857D7}" type="datetimeFigureOut">
               <a:rPr lang="ru-RU" smtClean="0"/>
-              <a:t>19.02.2024</a:t>
+              <a:t>27.02.2024</a:t>
             </a:fld>
             <a:endParaRPr lang="ru-RU"/>
           </a:p>
@@ -2102,7 +2102,7 @@
           <a:p>
             <a:fld id="{3A4BDD1D-B22B-4ED6-A560-FD2CA5D857D7}" type="datetimeFigureOut">
               <a:rPr lang="ru-RU" smtClean="0"/>
-              <a:t>19.02.2024</a:t>
+              <a:t>27.02.2024</a:t>
             </a:fld>
             <a:endParaRPr lang="ru-RU"/>
           </a:p>
@@ -2355,7 +2355,7 @@
           <a:p>
             <a:fld id="{3A4BDD1D-B22B-4ED6-A560-FD2CA5D857D7}" type="datetimeFigureOut">
               <a:rPr lang="ru-RU" smtClean="0"/>
-              <a:t>19.02.2024</a:t>
+              <a:t>27.02.2024</a:t>
             </a:fld>
             <a:endParaRPr lang="ru-RU"/>
           </a:p>
@@ -2568,7 +2568,7 @@
           <a:p>
             <a:fld id="{3A4BDD1D-B22B-4ED6-A560-FD2CA5D857D7}" type="datetimeFigureOut">
               <a:rPr lang="ru-RU" smtClean="0"/>
-              <a:t>19.02.2024</a:t>
+              <a:t>27.02.2024</a:t>
             </a:fld>
             <a:endParaRPr lang="ru-RU"/>
           </a:p>
@@ -14869,43 +14869,13 @@
       </p:sp>
       <p:sp>
         <p:nvSpPr>
-          <p:cNvPr id="5" name="TextBox 4"/>
-          <p:cNvSpPr txBox="1"/>
-          <p:nvPr/>
-        </p:nvSpPr>
-        <p:spPr>
-          <a:xfrm>
-            <a:off x="251722" y="1343939"/>
-            <a:ext cx="1193520" cy="369332"/>
-          </a:xfrm>
-          <a:prstGeom prst="rect">
-            <a:avLst/>
-          </a:prstGeom>
-          <a:noFill/>
-        </p:spPr>
-        <p:txBody>
-          <a:bodyPr wrap="square" rtlCol="0">
-            <a:spAutoFit/>
-          </a:bodyPr>
-          <a:lstStyle/>
-          <a:p>
-            <a:r>
-              <a:rPr lang="en-US" dirty="0" smtClean="0"/>
-              <a:t>REWGATE</a:t>
-            </a:r>
-            <a:endParaRPr lang="en-US" dirty="0"/>
-          </a:p>
-        </p:txBody>
-      </p:sp>
-      <p:sp>
-        <p:nvSpPr>
           <p:cNvPr id="6" name="TextBox 5"/>
           <p:cNvSpPr txBox="1"/>
           <p:nvPr/>
         </p:nvSpPr>
         <p:spPr>
           <a:xfrm>
-            <a:off x="7515407" y="156052"/>
+            <a:off x="4279258" y="156052"/>
             <a:ext cx="1782921" cy="369332"/>
           </a:xfrm>
           <a:prstGeom prst="rect">
@@ -19215,7 +19185,7 @@
   <a:extraClrSchemeLst/>
   <a:extLst>
     <a:ext uri="{05A4C25C-085E-4340-85A3-A5531E510DB2}">
-      <thm15:themeFamily xmlns="" xmlns:thm15="http://schemas.microsoft.com/office/thememl/2012/main" name="Office Theme" id="{62F939B6-93AF-4DB8-9C6B-D6C7DFDC589F}" vid="{4A3C46E8-61CC-4603-A589-7422A47A8E4A}"/>
+      <thm15:themeFamily xmlns:thm15="http://schemas.microsoft.com/office/thememl/2012/main" xmlns="" name="Office Theme" id="{62F939B6-93AF-4DB8-9C6B-D6C7DFDC589F}" vid="{4A3C46E8-61CC-4603-A589-7422A47A8E4A}"/>
     </a:ext>
   </a:extLst>
 </a:theme>

</xml_diff>